<commit_message>
added results from @marcinag for adaptive fec
</commit_message>
<xml_diff>
--- a/presentations/91-rmcat-adaptive-fec.pptx
+++ b/presentations/91-rmcat-adaptive-fec.pptx
@@ -5,7 +5,7 @@
     <p:sldMasterId id="2147483648" r:id="rId1"/>
   </p:sldMasterIdLst>
   <p:notesMasterIdLst>
-    <p:notesMasterId r:id="rId19"/>
+    <p:notesMasterId r:id="rId30"/>
   </p:notesMasterIdLst>
   <p:sldIdLst>
     <p:sldId id="256" r:id="rId2"/>
@@ -17,14 +17,25 @@
     <p:sldId id="257" r:id="rId8"/>
     <p:sldId id="260" r:id="rId9"/>
     <p:sldId id="264" r:id="rId10"/>
-    <p:sldId id="265" r:id="rId11"/>
-    <p:sldId id="258" r:id="rId12"/>
-    <p:sldId id="267" r:id="rId13"/>
-    <p:sldId id="269" r:id="rId14"/>
-    <p:sldId id="270" r:id="rId15"/>
-    <p:sldId id="272" r:id="rId16"/>
-    <p:sldId id="268" r:id="rId17"/>
-    <p:sldId id="271" r:id="rId18"/>
+    <p:sldId id="286" r:id="rId11"/>
+    <p:sldId id="287" r:id="rId12"/>
+    <p:sldId id="285" r:id="rId13"/>
+    <p:sldId id="265" r:id="rId14"/>
+    <p:sldId id="267" r:id="rId15"/>
+    <p:sldId id="269" r:id="rId16"/>
+    <p:sldId id="270" r:id="rId17"/>
+    <p:sldId id="274" r:id="rId18"/>
+    <p:sldId id="277" r:id="rId19"/>
+    <p:sldId id="279" r:id="rId20"/>
+    <p:sldId id="278" r:id="rId21"/>
+    <p:sldId id="281" r:id="rId22"/>
+    <p:sldId id="280" r:id="rId23"/>
+    <p:sldId id="282" r:id="rId24"/>
+    <p:sldId id="283" r:id="rId25"/>
+    <p:sldId id="288" r:id="rId26"/>
+    <p:sldId id="289" r:id="rId27"/>
+    <p:sldId id="290" r:id="rId28"/>
+    <p:sldId id="284" r:id="rId29"/>
   </p:sldIdLst>
   <p:sldSz cx="9144000" cy="6858000" type="screen4x3"/>
   <p:notesSz cx="6858000" cy="9144000"/>
@@ -208,7 +219,7 @@
           <a:p>
             <a:fld id="{4843EB3E-CD6D-0A43-BAE9-4E288A38C0E9}" type="datetimeFigureOut">
               <a:rPr lang="en-US" smtClean="0"/>
-              <a:t>24/07/14</a:t>
+              <a:t>06/11/14</a:t>
             </a:fld>
             <a:endParaRPr lang="en-US"/>
           </a:p>
@@ -571,7 +582,7 @@
           <a:p>
             <a:fld id="{DA445989-E8BA-5747-9858-731D54A39373}" type="slidenum">
               <a:rPr lang="en-US" smtClean="0"/>
-              <a:t>12</a:t>
+              <a:t>14</a:t>
             </a:fld>
             <a:endParaRPr lang="en-US"/>
           </a:p>
@@ -685,7 +696,7 @@
           <a:p>
             <a:fld id="{DA445989-E8BA-5747-9858-731D54A39373}" type="slidenum">
               <a:rPr lang="en-US" smtClean="0"/>
-              <a:t>16</a:t>
+              <a:t>26</a:t>
             </a:fld>
             <a:endParaRPr lang="en-US"/>
           </a:p>
@@ -885,7 +896,7 @@
           <a:p>
             <a:fld id="{648D20C4-97CA-5645-B449-D9BC5A557004}" type="datetimeFigureOut">
               <a:rPr lang="en-US" smtClean="0"/>
-              <a:t>24/07/14</a:t>
+              <a:t>06/11/14</a:t>
             </a:fld>
             <a:endParaRPr lang="en-US"/>
           </a:p>
@@ -1055,7 +1066,7 @@
           <a:p>
             <a:fld id="{648D20C4-97CA-5645-B449-D9BC5A557004}" type="datetimeFigureOut">
               <a:rPr lang="en-US" smtClean="0"/>
-              <a:t>24/07/14</a:t>
+              <a:t>06/11/14</a:t>
             </a:fld>
             <a:endParaRPr lang="en-US"/>
           </a:p>
@@ -1235,7 +1246,7 @@
           <a:p>
             <a:fld id="{648D20C4-97CA-5645-B449-D9BC5A557004}" type="datetimeFigureOut">
               <a:rPr lang="en-US" smtClean="0"/>
-              <a:t>24/07/14</a:t>
+              <a:t>06/11/14</a:t>
             </a:fld>
             <a:endParaRPr lang="en-US"/>
           </a:p>
@@ -1405,7 +1416,7 @@
           <a:p>
             <a:fld id="{648D20C4-97CA-5645-B449-D9BC5A557004}" type="datetimeFigureOut">
               <a:rPr lang="en-US" smtClean="0"/>
-              <a:t>24/07/14</a:t>
+              <a:t>06/11/14</a:t>
             </a:fld>
             <a:endParaRPr lang="en-US"/>
           </a:p>
@@ -1651,7 +1662,7 @@
           <a:p>
             <a:fld id="{648D20C4-97CA-5645-B449-D9BC5A557004}" type="datetimeFigureOut">
               <a:rPr lang="en-US" smtClean="0"/>
-              <a:t>24/07/14</a:t>
+              <a:t>06/11/14</a:t>
             </a:fld>
             <a:endParaRPr lang="en-US"/>
           </a:p>
@@ -1939,7 +1950,7 @@
           <a:p>
             <a:fld id="{648D20C4-97CA-5645-B449-D9BC5A557004}" type="datetimeFigureOut">
               <a:rPr lang="en-US" smtClean="0"/>
-              <a:t>24/07/14</a:t>
+              <a:t>06/11/14</a:t>
             </a:fld>
             <a:endParaRPr lang="en-US"/>
           </a:p>
@@ -2361,7 +2372,7 @@
           <a:p>
             <a:fld id="{648D20C4-97CA-5645-B449-D9BC5A557004}" type="datetimeFigureOut">
               <a:rPr lang="en-US" smtClean="0"/>
-              <a:t>24/07/14</a:t>
+              <a:t>06/11/14</a:t>
             </a:fld>
             <a:endParaRPr lang="en-US"/>
           </a:p>
@@ -2479,7 +2490,7 @@
           <a:p>
             <a:fld id="{648D20C4-97CA-5645-B449-D9BC5A557004}" type="datetimeFigureOut">
               <a:rPr lang="en-US" smtClean="0"/>
-              <a:t>24/07/14</a:t>
+              <a:t>06/11/14</a:t>
             </a:fld>
             <a:endParaRPr lang="en-US"/>
           </a:p>
@@ -2574,7 +2585,7 @@
           <a:p>
             <a:fld id="{648D20C4-97CA-5645-B449-D9BC5A557004}" type="datetimeFigureOut">
               <a:rPr lang="en-US" smtClean="0"/>
-              <a:t>24/07/14</a:t>
+              <a:t>06/11/14</a:t>
             </a:fld>
             <a:endParaRPr lang="en-US"/>
           </a:p>
@@ -2851,7 +2862,7 @@
           <a:p>
             <a:fld id="{648D20C4-97CA-5645-B449-D9BC5A557004}" type="datetimeFigureOut">
               <a:rPr lang="en-US" smtClean="0"/>
-              <a:t>24/07/14</a:t>
+              <a:t>06/11/14</a:t>
             </a:fld>
             <a:endParaRPr lang="en-US"/>
           </a:p>
@@ -3104,7 +3115,7 @@
           <a:p>
             <a:fld id="{648D20C4-97CA-5645-B449-D9BC5A557004}" type="datetimeFigureOut">
               <a:rPr lang="en-US" smtClean="0"/>
-              <a:t>24/07/14</a:t>
+              <a:t>06/11/14</a:t>
             </a:fld>
             <a:endParaRPr lang="en-US"/>
           </a:p>
@@ -3317,7 +3328,7 @@
           <a:p>
             <a:fld id="{648D20C4-97CA-5645-B449-D9BC5A557004}" type="datetimeFigureOut">
               <a:rPr lang="en-US" smtClean="0"/>
-              <a:t>24/07/14</a:t>
+              <a:t>06/11/14</a:t>
             </a:fld>
             <a:endParaRPr lang="en-US"/>
           </a:p>
@@ -3776,13 +3787,22 @@
           <a:p>
             <a:r>
               <a:rPr lang="en-US" dirty="0" smtClean="0"/>
-              <a:t>IETF 90, Toronto, </a:t>
-            </a:r>
-          </a:p>
-          <a:p>
+              <a:t>IETF </a:t>
+            </a:r>
             <a:r>
               <a:rPr lang="en-US" dirty="0" smtClean="0"/>
-              <a:t>24. July 2014</a:t>
+              <a:t>91, Honolulu, </a:t>
+            </a:r>
+            <a:endParaRPr lang="en-US" dirty="0" smtClean="0"/>
+          </a:p>
+          <a:p>
+            <a:r>
+              <a:rPr lang="en-US" dirty="0" smtClean="0"/>
+              <a:t>09. November </a:t>
+            </a:r>
+            <a:r>
+              <a:rPr lang="en-US" dirty="0" smtClean="0"/>
+              <a:t>2014</a:t>
             </a:r>
           </a:p>
           <a:p>
@@ -3790,22 +3810,24 @@
           </a:p>
           <a:p>
             <a:r>
-              <a:rPr lang="pl-PL" dirty="0" err="1" smtClean="0"/>
-              <a:t>tools.ietf.org</a:t>
-            </a:r>
-            <a:r>
-              <a:rPr lang="pl-PL" dirty="0" smtClean="0"/>
-              <a:t>/</a:t>
-            </a:r>
-            <a:r>
-              <a:rPr lang="pl-PL" dirty="0" err="1" smtClean="0"/>
-              <a:t>html</a:t>
-            </a:r>
-            <a:r>
-              <a:rPr lang="pl-PL" dirty="0" smtClean="0"/>
-              <a:t>/draft-singh-rmcat-adaptive-fec-00</a:t>
-            </a:r>
-            <a:endParaRPr lang="en-US" dirty="0"/>
+              <a:rPr lang="pl-PL" sz="2200" dirty="0" smtClean="0">
+                <a:hlinkClick r:id="rId2"/>
+              </a:rPr>
+              <a:t>https://tools.ietf.org</a:t>
+            </a:r>
+            <a:r>
+              <a:rPr lang="pl-PL" sz="2200" dirty="0" smtClean="0">
+                <a:hlinkClick r:id="rId2"/>
+              </a:rPr>
+              <a:t>/html/draft-singh-rmcat-adaptive-fec-</a:t>
+            </a:r>
+            <a:r>
+              <a:rPr lang="pl-PL" sz="2200" dirty="0" smtClean="0">
+                <a:hlinkClick r:id="rId2"/>
+              </a:rPr>
+              <a:t>01</a:t>
+            </a:r>
+            <a:endParaRPr lang="en-US" sz="2200" dirty="0"/>
           </a:p>
         </p:txBody>
       </p:sp>
@@ -3856,7 +3878,11 @@
           <a:p>
             <a:r>
               <a:rPr lang="en-US" dirty="0" smtClean="0"/>
-              <a:t>Applicability</a:t>
+              <a:t>Calculating </a:t>
+            </a:r>
+            <a:r>
+              <a:rPr lang="en-US" dirty="0" err="1" smtClean="0"/>
+              <a:t>goodput</a:t>
             </a:r>
             <a:endParaRPr lang="en-US" dirty="0"/>
           </a:p>
@@ -3874,116 +3900,181 @@
         </p:nvSpPr>
         <p:spPr/>
         <p:txBody>
-          <a:bodyPr/>
+          <a:bodyPr>
+            <a:normAutofit lnSpcReduction="10000"/>
+          </a:bodyPr>
           <a:lstStyle/>
           <a:p>
             <a:r>
               <a:rPr lang="en-US" dirty="0" smtClean="0"/>
-              <a:t>Implemented over a delay-based congestion control</a:t>
+              <a:t>Receiver reports </a:t>
+            </a:r>
+            <a:r>
+              <a:rPr lang="en-US" dirty="0" err="1" smtClean="0"/>
+              <a:t>goodput</a:t>
+            </a:r>
+            <a:r>
+              <a:rPr lang="en-US" dirty="0" smtClean="0"/>
+              <a:t>:</a:t>
             </a:r>
           </a:p>
           <a:p>
             <a:pPr lvl="1"/>
             <a:r>
+              <a:rPr lang="en-US" dirty="0" err="1" smtClean="0"/>
+              <a:t>Goodbytes</a:t>
+            </a:r>
+            <a:r>
               <a:rPr lang="en-US" dirty="0" smtClean="0"/>
-              <a:t>See paper for details</a:t>
-            </a:r>
-          </a:p>
-          <a:p>
+              <a:t> in reporting interval = </a:t>
+            </a:r>
+          </a:p>
+          <a:p>
+            <a:pPr marL="457200" lvl="1" indent="0">
+              <a:buNone/>
+            </a:pPr>
+            <a:r>
+              <a:rPr lang="en-US" dirty="0"/>
+              <a:t>	</a:t>
+            </a:r>
+            <a:r>
+              <a:rPr lang="en-US" dirty="0" smtClean="0"/>
+              <a:t>bytes received – bytes discarded</a:t>
+            </a:r>
+          </a:p>
+          <a:p>
+            <a:pPr lvl="1"/>
+            <a:endParaRPr lang="en-US" dirty="0" smtClean="0"/>
+          </a:p>
+          <a:p>
+            <a:pPr marL="457200" lvl="1" indent="0">
+              <a:buNone/>
+            </a:pPr>
+            <a:r>
+              <a:rPr lang="en-US" dirty="0" smtClean="0"/>
+              <a:t>													OR</a:t>
+            </a:r>
+          </a:p>
+          <a:p>
+            <a:pPr lvl="1"/>
+            <a:endParaRPr lang="en-US" dirty="0" smtClean="0"/>
+          </a:p>
+          <a:p>
+            <a:r>
+              <a:rPr lang="en-US" dirty="0" smtClean="0"/>
+              <a:t>Sender calculates </a:t>
+            </a:r>
+            <a:r>
+              <a:rPr lang="en-US" dirty="0" err="1" smtClean="0"/>
+              <a:t>goodput</a:t>
+            </a:r>
+            <a:r>
+              <a:rPr lang="en-US" dirty="0" smtClean="0"/>
+              <a:t>:</a:t>
+            </a:r>
+          </a:p>
+          <a:p>
+            <a:pPr lvl="1"/>
+            <a:r>
+              <a:rPr lang="en-US" dirty="0" err="1" smtClean="0"/>
+              <a:t>Goodbytes</a:t>
+            </a:r>
+            <a:r>
+              <a:rPr lang="en-US" dirty="0" smtClean="0"/>
+              <a:t> in reporting interval = </a:t>
+            </a:r>
+          </a:p>
+          <a:p>
+            <a:pPr marL="457200" lvl="1" indent="0">
+              <a:buNone/>
+            </a:pPr>
+            <a:r>
+              <a:rPr lang="en-US" dirty="0"/>
+              <a:t>	</a:t>
+            </a:r>
+            <a:r>
+              <a:rPr lang="en-US" dirty="0" smtClean="0"/>
+              <a:t>	bytes sent – bytes lost – bytes discarded</a:t>
+            </a:r>
+          </a:p>
+          <a:p>
+            <a:pPr lvl="1"/>
             <a:endParaRPr lang="en-US" dirty="0"/>
           </a:p>
-          <a:p>
-            <a:r>
-              <a:rPr lang="en-US" dirty="0" smtClean="0"/>
-              <a:t>However would like to generalize it.</a:t>
-            </a:r>
-          </a:p>
-          <a:p>
-            <a:pPr lvl="1"/>
-            <a:r>
-              <a:rPr lang="en-US" dirty="0" smtClean="0"/>
-              <a:t>Apply to </a:t>
-            </a:r>
-            <a:r>
-              <a:rPr lang="en-US" dirty="0" err="1" smtClean="0"/>
-              <a:t>SCReAM</a:t>
-            </a:r>
-            <a:r>
-              <a:rPr lang="en-US" dirty="0" smtClean="0"/>
-              <a:t>, GCC, …</a:t>
-            </a:r>
-            <a:endParaRPr lang="en-US" dirty="0"/>
-          </a:p>
-        </p:txBody>
-      </p:sp>
-      <p:sp>
-        <p:nvSpPr>
-          <p:cNvPr id="4" name="Rectangle 3"/>
+        </p:txBody>
+      </p:sp>
+      <p:sp>
+        <p:nvSpPr>
+          <p:cNvPr id="4" name="Left Brace 3"/>
           <p:cNvSpPr/>
           <p:nvPr/>
         </p:nvSpPr>
         <p:spPr>
-          <a:xfrm>
-            <a:off x="1126315" y="6366271"/>
-            <a:ext cx="8017685" cy="461665"/>
+          <a:xfrm rot="16200000">
+            <a:off x="5720441" y="4570618"/>
+            <a:ext cx="436973" cy="3225027"/>
+          </a:xfrm>
+          <a:prstGeom prst="leftBrace">
+            <a:avLst/>
+          </a:prstGeom>
+        </p:spPr>
+        <p:style>
+          <a:lnRef idx="1">
+            <a:schemeClr val="dk1"/>
+          </a:lnRef>
+          <a:fillRef idx="0">
+            <a:schemeClr val="dk1"/>
+          </a:fillRef>
+          <a:effectRef idx="0">
+            <a:schemeClr val="dk1"/>
+          </a:effectRef>
+          <a:fontRef idx="minor">
+            <a:schemeClr val="tx1"/>
+          </a:fontRef>
+        </p:style>
+        <p:txBody>
+          <a:bodyPr rtlCol="0" anchor="ctr"/>
+          <a:lstStyle/>
+          <a:p>
+            <a:pPr algn="ctr"/>
+            <a:endParaRPr lang="en-US"/>
+          </a:p>
+        </p:txBody>
+      </p:sp>
+      <p:sp>
+        <p:nvSpPr>
+          <p:cNvPr id="5" name="TextBox 4"/>
+          <p:cNvSpPr txBox="1"/>
+          <p:nvPr/>
+        </p:nvSpPr>
+        <p:spPr>
+          <a:xfrm>
+            <a:off x="5202711" y="6475013"/>
+            <a:ext cx="1479892" cy="369332"/>
           </a:xfrm>
           <a:prstGeom prst="rect">
             <a:avLst/>
           </a:prstGeom>
-        </p:spPr>
-        <p:txBody>
-          <a:bodyPr wrap="square">
+          <a:noFill/>
+        </p:spPr>
+        <p:txBody>
+          <a:bodyPr wrap="none" rtlCol="0">
             <a:spAutoFit/>
           </a:bodyPr>
           <a:lstStyle/>
           <a:p>
-            <a:pPr lvl="1"/>
-            <a:r>
-              <a:rPr lang="en-US" sz="1200" dirty="0"/>
-              <a:t>Nagy M., Singh V., </a:t>
-            </a:r>
-            <a:r>
-              <a:rPr lang="en-US" sz="1200" dirty="0" err="1"/>
-              <a:t>Ott</a:t>
-            </a:r>
-            <a:r>
-              <a:rPr lang="en-US" sz="1200" dirty="0"/>
-              <a:t> J., </a:t>
-            </a:r>
-            <a:r>
-              <a:rPr lang="en-US" sz="1200" dirty="0" err="1"/>
-              <a:t>Eggert</a:t>
-            </a:r>
-            <a:r>
-              <a:rPr lang="en-US" sz="1200" dirty="0"/>
-              <a:t> L., </a:t>
-            </a:r>
-            <a:r>
-              <a:rPr lang="en-US" sz="1200" dirty="0">
-                <a:latin typeface="Consolas"/>
-                <a:cs typeface="Consolas"/>
-              </a:rPr>
-              <a:t>Congestion Control using FEC for Conversational </a:t>
-            </a:r>
-            <a:r>
-              <a:rPr lang="en-US" sz="1200" dirty="0" smtClean="0">
-                <a:latin typeface="Consolas"/>
-                <a:cs typeface="Consolas"/>
-              </a:rPr>
-              <a:t>Multimedia Communication</a:t>
-            </a:r>
-            <a:r>
-              <a:rPr lang="en-US" sz="1200" dirty="0"/>
-              <a:t>, Proc. of ACM Multimedia Systems, Singapore, SG, Mar, 2014,</a:t>
-            </a:r>
-            <a:endParaRPr lang="en-US" sz="1400" dirty="0"/>
+            <a:r>
+              <a:rPr lang="en-US" dirty="0" smtClean="0"/>
+              <a:t>RLE reports</a:t>
+            </a:r>
+            <a:endParaRPr lang="en-US" dirty="0"/>
           </a:p>
         </p:txBody>
       </p:sp>
     </p:spTree>
     <p:extLst>
       <p:ext uri="{BB962C8B-B14F-4D97-AF65-F5344CB8AC3E}">
-        <p14:creationId xmlns:p14="http://schemas.microsoft.com/office/powerpoint/2010/main" val="1187535467"/>
+        <p14:creationId xmlns:p14="http://schemas.microsoft.com/office/powerpoint/2010/main" val="3291972541"/>
       </p:ext>
     </p:extLst>
   </p:cSld>
@@ -4026,8 +4117,12 @@
           <a:lstStyle/>
           <a:p>
             <a:r>
+              <a:rPr lang="en-US" dirty="0"/>
+              <a:t>U</a:t>
+            </a:r>
+            <a:r>
               <a:rPr lang="en-US" dirty="0" smtClean="0"/>
-              <a:t>Next steps</a:t>
+              <a:t>ndershoot</a:t>
             </a:r>
             <a:endParaRPr lang="en-US" dirty="0"/>
           </a:p>
@@ -4046,103 +4141,169 @@
         <p:spPr/>
         <p:txBody>
           <a:bodyPr>
-            <a:normAutofit fontScale="92500" lnSpcReduction="10000"/>
+            <a:normAutofit fontScale="92500" lnSpcReduction="20000"/>
           </a:bodyPr>
           <a:lstStyle/>
           <a:p>
             <a:r>
               <a:rPr lang="en-US" dirty="0" smtClean="0"/>
-              <a:t>Code: (coming soon)</a:t>
+              <a:t>Congestion reported</a:t>
             </a:r>
           </a:p>
           <a:p>
             <a:pPr lvl="1"/>
             <a:r>
-              <a:rPr lang="sv-SE" sz="1800" dirty="0" smtClean="0">
+              <a:rPr lang="en-US" dirty="0" smtClean="0"/>
+              <a:t>Sender calculates duration of congestion = </a:t>
+            </a:r>
+          </a:p>
+          <a:p>
+            <a:pPr marL="914400" lvl="2" indent="0">
+              <a:buNone/>
+            </a:pPr>
+            <a:r>
+              <a:rPr lang="en-US" dirty="0"/>
+              <a:t>HSN when RTCP scheduled – HSN when congestion </a:t>
+            </a:r>
+            <a:r>
+              <a:rPr lang="en-US" dirty="0" smtClean="0"/>
+              <a:t>detected</a:t>
+            </a:r>
+          </a:p>
+          <a:p>
+            <a:pPr lvl="1"/>
+            <a:r>
+              <a:rPr lang="en-US" dirty="0" smtClean="0"/>
+              <a:t>undershoot bytes = sending rate * duration/8</a:t>
+            </a:r>
+          </a:p>
+          <a:p>
+            <a:pPr lvl="1"/>
+            <a:r>
+              <a:rPr lang="en-US" dirty="0" smtClean="0"/>
+              <a:t>New rate = </a:t>
+            </a:r>
+            <a:r>
+              <a:rPr lang="en-US" dirty="0" err="1" smtClean="0"/>
+              <a:t>Goodbytes</a:t>
+            </a:r>
+            <a:r>
+              <a:rPr lang="en-US" dirty="0" smtClean="0"/>
+              <a:t> – undershoot bytes [1]</a:t>
+            </a:r>
+          </a:p>
+          <a:p>
+            <a:pPr lvl="1"/>
+            <a:endParaRPr lang="en-US" dirty="0" smtClean="0"/>
+          </a:p>
+          <a:p>
+            <a:pPr marL="3200400" lvl="7" indent="0">
+              <a:buNone/>
+            </a:pPr>
+            <a:r>
+              <a:rPr lang="en-US" dirty="0" smtClean="0"/>
+              <a:t>OR</a:t>
+            </a:r>
+          </a:p>
+          <a:p>
+            <a:pPr lvl="1"/>
+            <a:endParaRPr lang="en-US" dirty="0"/>
+          </a:p>
+          <a:p>
+            <a:pPr lvl="1"/>
+            <a:r>
+              <a:rPr lang="en-US" dirty="0" smtClean="0"/>
+              <a:t>Delta = Sending rate – </a:t>
+            </a:r>
+            <a:r>
+              <a:rPr lang="en-US" dirty="0" err="1" smtClean="0"/>
+              <a:t>goodput</a:t>
+            </a:r>
+            <a:endParaRPr lang="en-US" dirty="0" smtClean="0"/>
+          </a:p>
+          <a:p>
+            <a:pPr lvl="1"/>
+            <a:r>
+              <a:rPr lang="en-US" dirty="0" smtClean="0"/>
+              <a:t>New rate = sending rate – 2 x delta [2]</a:t>
+            </a:r>
+          </a:p>
+        </p:txBody>
+      </p:sp>
+      <p:sp>
+        <p:nvSpPr>
+          <p:cNvPr id="4" name="Rectangle 3"/>
+          <p:cNvSpPr/>
+          <p:nvPr/>
+        </p:nvSpPr>
+        <p:spPr>
+          <a:xfrm>
+            <a:off x="3743026" y="6223120"/>
+            <a:ext cx="5400974" cy="461665"/>
+          </a:xfrm>
+          <a:prstGeom prst="rect">
+            <a:avLst/>
+          </a:prstGeom>
+        </p:spPr>
+        <p:txBody>
+          <a:bodyPr wrap="square">
+            <a:spAutoFit/>
+          </a:bodyPr>
+          <a:lstStyle/>
+          <a:p>
+            <a:r>
+              <a:rPr lang="pl-PL" sz="1200" dirty="0" smtClean="0"/>
+              <a:t>[1] </a:t>
+            </a:r>
+            <a:r>
+              <a:rPr lang="pl-PL" sz="1200" dirty="0" smtClean="0">
                 <a:hlinkClick r:id="rId2"/>
               </a:rPr>
-              <a:t>https://github.com/protocols-comnet/rmcat-adaptive-fec-code</a:t>
-            </a:r>
-            <a:r>
-              <a:rPr lang="sv-SE" dirty="0" smtClean="0"/>
+              <a:t>http</a:t>
+            </a:r>
+            <a:r>
+              <a:rPr lang="pl-PL" sz="1200" dirty="0">
+                <a:hlinkClick r:id="rId2"/>
+              </a:rPr>
+              <a:t>://www.netlab.tkk.fi/~jo/papers/2012-videv-rate-</a:t>
+            </a:r>
+            <a:r>
+              <a:rPr lang="pl-PL" sz="1200" dirty="0" smtClean="0">
+                <a:hlinkClick r:id="rId2"/>
+              </a:rPr>
+              <a:t>control.pdf</a:t>
+            </a:r>
+            <a:endParaRPr lang="pl-PL" sz="1200" dirty="0" smtClean="0"/>
+          </a:p>
+          <a:p>
+            <a:r>
+              <a:rPr lang="pl-PL" sz="1200" dirty="0" smtClean="0"/>
+              <a:t>[2] </a:t>
+            </a:r>
+            <a:r>
+              <a:rPr lang="hu-HU" sz="1200" dirty="0">
+                <a:hlinkClick r:id="rId3"/>
+              </a:rPr>
+              <a:t>http://www.netlab.tkk.fi/~varun/</a:t>
+            </a:r>
+            <a:r>
+              <a:rPr lang="hu-HU" sz="1200" dirty="0" smtClean="0">
+                <a:hlinkClick r:id="rId3"/>
+              </a:rPr>
+              <a:t>nagy2014mmsys.pdf</a:t>
+            </a:r>
+            <a:r>
+              <a:rPr lang="hu-HU" sz="1200" dirty="0" smtClean="0"/>
               <a:t> </a:t>
             </a:r>
-          </a:p>
-          <a:p>
-            <a:endParaRPr lang="en-US" dirty="0" smtClean="0"/>
-          </a:p>
-          <a:p>
-            <a:r>
-              <a:rPr lang="en-US" dirty="0" smtClean="0"/>
-              <a:t>Evaluation Paper:</a:t>
-            </a:r>
-          </a:p>
-          <a:p>
-            <a:pPr lvl="1"/>
-            <a:r>
-              <a:rPr lang="en-US" sz="1600" dirty="0" smtClean="0"/>
-              <a:t>Nagy M., Singh V., </a:t>
-            </a:r>
-            <a:r>
-              <a:rPr lang="en-US" sz="1600" dirty="0" err="1" smtClean="0"/>
-              <a:t>Ott</a:t>
-            </a:r>
-            <a:r>
-              <a:rPr lang="en-US" sz="1600" dirty="0" smtClean="0"/>
-              <a:t> J., </a:t>
-            </a:r>
-            <a:r>
-              <a:rPr lang="en-US" sz="1600" dirty="0" err="1" smtClean="0"/>
-              <a:t>Eggert</a:t>
-            </a:r>
-            <a:r>
-              <a:rPr lang="en-US" sz="1600" dirty="0" smtClean="0"/>
-              <a:t> L., Congestion Control using FEC for Conversational Multimedia Communication, Proc. of ACM Multimedia Systems, Singapore, SG, Mar, 2014,</a:t>
-            </a:r>
-            <a:endParaRPr lang="en-US" dirty="0" smtClean="0"/>
-          </a:p>
-          <a:p>
-            <a:pPr lvl="8"/>
-            <a:endParaRPr lang="en-US" dirty="0" smtClean="0"/>
-          </a:p>
-          <a:p>
-            <a:r>
-              <a:rPr lang="en-US" dirty="0" smtClean="0"/>
-              <a:t>Initial comments received from </a:t>
-            </a:r>
-            <a:r>
-              <a:rPr lang="en-US" dirty="0" err="1" smtClean="0"/>
-              <a:t>Ingemar</a:t>
-            </a:r>
-            <a:r>
-              <a:rPr lang="en-US" dirty="0" smtClean="0"/>
-              <a:t> Johansson</a:t>
-            </a:r>
-          </a:p>
-          <a:p>
-            <a:pPr lvl="1"/>
-            <a:r>
-              <a:rPr lang="en-US" dirty="0" smtClean="0"/>
-              <a:t>More feedback is appreciated </a:t>
-            </a:r>
-            <a:r>
-              <a:rPr lang="en-US" dirty="0" smtClean="0">
-                <a:sym typeface="Wingdings"/>
-              </a:rPr>
-              <a:t></a:t>
-            </a:r>
-            <a:endParaRPr lang="en-US" dirty="0" smtClean="0"/>
-          </a:p>
-          <a:p>
-            <a:pPr lvl="1"/>
-            <a:endParaRPr lang="en-US" dirty="0"/>
+            <a:endParaRPr lang="en-US" sz="1200" dirty="0"/>
           </a:p>
         </p:txBody>
       </p:sp>
     </p:spTree>
     <p:extLst>
       <p:ext uri="{BB962C8B-B14F-4D97-AF65-F5344CB8AC3E}">
-        <p14:creationId xmlns:p14="http://schemas.microsoft.com/office/powerpoint/2010/main" val="471850459"/>
+        <p14:creationId xmlns:p14="http://schemas.microsoft.com/office/powerpoint/2010/main" val="254143530"/>
       </p:ext>
     </p:extLst>
   </p:cSld>
@@ -4171,7 +4332,7 @@
       </p:grpSpPr>
       <p:sp>
         <p:nvSpPr>
-          <p:cNvPr id="4" name="Title 3"/>
+          <p:cNvPr id="2" name="Title 1"/>
           <p:cNvSpPr>
             <a:spLocks noGrp="1"/>
           </p:cNvSpPr>
@@ -4184,10 +4345,9 @@
           <a:bodyPr/>
           <a:lstStyle/>
           <a:p>
-            <a:pPr algn="ctr"/>
             <a:r>
               <a:rPr lang="en-US" dirty="0" smtClean="0"/>
-              <a:t>Evaluation (1/3)</a:t>
+              <a:t>Typical results</a:t>
             </a:r>
             <a:endParaRPr lang="en-US" dirty="0"/>
           </a:p>
@@ -4195,123 +4355,61 @@
       </p:sp>
       <p:sp>
         <p:nvSpPr>
-          <p:cNvPr id="3" name="TextBox 2"/>
-          <p:cNvSpPr txBox="1"/>
-          <p:nvPr/>
-        </p:nvSpPr>
-        <p:spPr>
-          <a:xfrm>
-            <a:off x="325027" y="6371213"/>
-            <a:ext cx="6878806" cy="369332"/>
-          </a:xfrm>
-          <a:prstGeom prst="rect">
-            <a:avLst/>
-          </a:prstGeom>
-          <a:noFill/>
-        </p:spPr>
-        <p:txBody>
-          <a:bodyPr wrap="none" rtlCol="0">
-            <a:spAutoFit/>
-          </a:bodyPr>
-          <a:lstStyle/>
-          <a:p>
-            <a:pPr marL="285750" indent="-285750">
-              <a:buFont typeface="Arial"/>
-              <a:buChar char="•"/>
-            </a:pPr>
+          <p:cNvPr id="3" name="Content Placeholder 2"/>
+          <p:cNvSpPr>
+            <a:spLocks noGrp="1"/>
+          </p:cNvSpPr>
+          <p:nvPr>
+            <p:ph idx="1"/>
+          </p:nvPr>
+        </p:nvSpPr>
+        <p:spPr/>
+        <p:txBody>
+          <a:bodyPr/>
+          <a:lstStyle/>
+          <a:p>
             <a:r>
               <a:rPr lang="en-US" dirty="0" smtClean="0"/>
-              <a:t>Ns-2 simulation, Variable link capacity, Single flow on the link</a:t>
+              <a:t>~90% recovery in time for decoding when FEC interval was short</a:t>
+            </a:r>
+          </a:p>
+          <a:p>
+            <a:pPr lvl="1"/>
+            <a:r>
+              <a:rPr lang="en-US" dirty="0" smtClean="0"/>
+              <a:t>Fewer packets protected</a:t>
+            </a:r>
+          </a:p>
+          <a:p>
+            <a:pPr lvl="1"/>
+            <a:endParaRPr lang="en-US" dirty="0" smtClean="0"/>
+          </a:p>
+          <a:p>
+            <a:r>
+              <a:rPr lang="en-US" dirty="0" smtClean="0"/>
+              <a:t>~80% recovery in time for decoding when FEC interval was long</a:t>
+            </a:r>
+          </a:p>
+          <a:p>
+            <a:pPr lvl="1"/>
+            <a:r>
+              <a:rPr lang="en-US" dirty="0" smtClean="0"/>
+              <a:t>More packets protected</a:t>
             </a:r>
             <a:endParaRPr lang="en-US" dirty="0"/>
-          </a:p>
-        </p:txBody>
-      </p:sp>
-      <p:pic>
-        <p:nvPicPr>
-          <p:cNvPr id="10" name="Picture 9" descr="ns-var-50ms-2.pdf"/>
-          <p:cNvPicPr>
-            <a:picLocks noChangeAspect="1"/>
-          </p:cNvPicPr>
-          <p:nvPr/>
-        </p:nvPicPr>
-        <p:blipFill>
-          <a:blip r:embed="rId3">
-            <a:extLst>
-              <a:ext uri="{28A0092B-C50C-407E-A947-70E740481C1C}">
-                <a14:useLocalDpi xmlns:a14="http://schemas.microsoft.com/office/drawing/2010/main" val="0"/>
-              </a:ext>
-            </a:extLst>
-          </a:blip>
-          <a:stretch>
-            <a:fillRect/>
-          </a:stretch>
-        </p:blipFill>
-        <p:spPr>
-          <a:xfrm>
-            <a:off x="0" y="1417638"/>
-            <a:ext cx="9144000" cy="4572000"/>
-          </a:xfrm>
-          <a:prstGeom prst="rect">
-            <a:avLst/>
-          </a:prstGeom>
-        </p:spPr>
-      </p:pic>
-      <p:sp>
-        <p:nvSpPr>
-          <p:cNvPr id="11" name="TextBox 10"/>
-          <p:cNvSpPr txBox="1"/>
-          <p:nvPr/>
-        </p:nvSpPr>
-        <p:spPr>
-          <a:xfrm>
-            <a:off x="1420160" y="1688453"/>
-            <a:ext cx="1505540" cy="369332"/>
-          </a:xfrm>
-          <a:prstGeom prst="rect">
-            <a:avLst/>
-          </a:prstGeom>
-          <a:noFill/>
-        </p:spPr>
-        <p:txBody>
-          <a:bodyPr wrap="none" rtlCol="0">
-            <a:spAutoFit/>
-          </a:bodyPr>
-          <a:lstStyle/>
-          <a:p>
-            <a:r>
-              <a:rPr lang="en-US" dirty="0" smtClean="0">
-                <a:solidFill>
-                  <a:srgbClr val="FF6600"/>
-                </a:solidFill>
-              </a:rPr>
-              <a:t>OWD: 50ms</a:t>
-            </a:r>
-            <a:endParaRPr lang="en-US" dirty="0">
-              <a:solidFill>
-                <a:srgbClr val="FF6600"/>
-              </a:solidFill>
-            </a:endParaRPr>
           </a:p>
         </p:txBody>
       </p:sp>
     </p:spTree>
     <p:extLst>
       <p:ext uri="{BB962C8B-B14F-4D97-AF65-F5344CB8AC3E}">
-        <p14:creationId xmlns:p14="http://schemas.microsoft.com/office/powerpoint/2010/main" val="1759177461"/>
+        <p14:creationId xmlns:p14="http://schemas.microsoft.com/office/powerpoint/2010/main" val="1888432222"/>
       </p:ext>
     </p:extLst>
   </p:cSld>
   <p:clrMapOvr>
     <a:masterClrMapping/>
   </p:clrMapOvr>
-  <p:timing>
-    <p:tnLst>
-      <p:par>
-        <p:cTn xmlns:p14="http://schemas.microsoft.com/office/powerpoint/2010/main" id="1" dur="indefinite" restart="never" nodeType="tmRoot"/>
-      </p:par>
-    </p:tnLst>
-  </p:timing>
 </p:sld>
 </file>
 
@@ -4348,89 +4446,135 @@
           <a:lstStyle/>
           <a:p>
             <a:r>
-              <a:rPr lang="en-US" dirty="0"/>
-              <a:t>Evaluation </a:t>
-            </a:r>
-            <a:r>
               <a:rPr lang="en-US" dirty="0" smtClean="0"/>
-              <a:t>(2/3)</a:t>
+              <a:t>Applicability</a:t>
             </a:r>
             <a:endParaRPr lang="en-US" dirty="0"/>
           </a:p>
         </p:txBody>
       </p:sp>
-      <p:pic>
-        <p:nvPicPr>
-          <p:cNvPr id="3" name="Picture 2" descr="ns-var-100ms-2.pdf"/>
-          <p:cNvPicPr>
-            <a:picLocks noChangeAspect="1"/>
-          </p:cNvPicPr>
-          <p:nvPr/>
-        </p:nvPicPr>
-        <p:blipFill>
-          <a:blip r:embed="rId2">
-            <a:extLst>
-              <a:ext uri="{28A0092B-C50C-407E-A947-70E740481C1C}">
-                <a14:useLocalDpi xmlns:a14="http://schemas.microsoft.com/office/drawing/2010/main" val="0"/>
-              </a:ext>
-            </a:extLst>
-          </a:blip>
-          <a:stretch>
-            <a:fillRect/>
-          </a:stretch>
-        </p:blipFill>
-        <p:spPr>
-          <a:xfrm>
-            <a:off x="0" y="1417638"/>
-            <a:ext cx="9144000" cy="4572000"/>
+      <p:sp>
+        <p:nvSpPr>
+          <p:cNvPr id="3" name="Content Placeholder 2"/>
+          <p:cNvSpPr>
+            <a:spLocks noGrp="1"/>
+          </p:cNvSpPr>
+          <p:nvPr>
+            <p:ph idx="1"/>
+          </p:nvPr>
+        </p:nvSpPr>
+        <p:spPr/>
+        <p:txBody>
+          <a:bodyPr/>
+          <a:lstStyle/>
+          <a:p>
+            <a:r>
+              <a:rPr lang="en-US" dirty="0" smtClean="0"/>
+              <a:t>Implemented over a delay-based congestion control</a:t>
+            </a:r>
+          </a:p>
+          <a:p>
+            <a:pPr lvl="1"/>
+            <a:r>
+              <a:rPr lang="en-US" dirty="0" smtClean="0"/>
+              <a:t>See paper for details</a:t>
+            </a:r>
+          </a:p>
+          <a:p>
+            <a:endParaRPr lang="en-US" dirty="0"/>
+          </a:p>
+          <a:p>
+            <a:r>
+              <a:rPr lang="en-US" dirty="0" smtClean="0"/>
+              <a:t>However would like to generalize it.</a:t>
+            </a:r>
+          </a:p>
+          <a:p>
+            <a:pPr lvl="1"/>
+            <a:r>
+              <a:rPr lang="en-US" dirty="0" smtClean="0"/>
+              <a:t>Apply to </a:t>
+            </a:r>
+            <a:r>
+              <a:rPr lang="en-US" dirty="0" err="1" smtClean="0"/>
+              <a:t>SCReAM</a:t>
+            </a:r>
+            <a:r>
+              <a:rPr lang="en-US" dirty="0" smtClean="0"/>
+              <a:t>, GCC, …</a:t>
+            </a:r>
+            <a:endParaRPr lang="en-US" dirty="0"/>
+          </a:p>
+        </p:txBody>
+      </p:sp>
+      <p:sp>
+        <p:nvSpPr>
+          <p:cNvPr id="4" name="Rectangle 3"/>
+          <p:cNvSpPr/>
+          <p:nvPr/>
+        </p:nvSpPr>
+        <p:spPr>
+          <a:xfrm>
+            <a:off x="1126315" y="6366271"/>
+            <a:ext cx="8017685" cy="461665"/>
           </a:xfrm>
           <a:prstGeom prst="rect">
             <a:avLst/>
           </a:prstGeom>
         </p:spPr>
-      </p:pic>
-      <p:sp>
-        <p:nvSpPr>
-          <p:cNvPr id="4" name="TextBox 3"/>
-          <p:cNvSpPr txBox="1"/>
-          <p:nvPr/>
-        </p:nvSpPr>
-        <p:spPr>
-          <a:xfrm>
-            <a:off x="1031015" y="1688453"/>
-            <a:ext cx="1582484" cy="369332"/>
-          </a:xfrm>
-          <a:prstGeom prst="rect">
-            <a:avLst/>
-          </a:prstGeom>
-          <a:noFill/>
-        </p:spPr>
-        <p:txBody>
-          <a:bodyPr wrap="none" rtlCol="0">
+        <p:txBody>
+          <a:bodyPr wrap="square">
             <a:spAutoFit/>
           </a:bodyPr>
           <a:lstStyle/>
           <a:p>
-            <a:r>
-              <a:rPr lang="en-US" dirty="0" smtClean="0">
-                <a:solidFill>
-                  <a:srgbClr val="FF6600"/>
-                </a:solidFill>
+            <a:pPr lvl="1"/>
+            <a:r>
+              <a:rPr lang="en-US" sz="1200" dirty="0"/>
+              <a:t>Nagy M., Singh V., </a:t>
+            </a:r>
+            <a:r>
+              <a:rPr lang="en-US" sz="1200" dirty="0" err="1"/>
+              <a:t>Ott</a:t>
+            </a:r>
+            <a:r>
+              <a:rPr lang="en-US" sz="1200" dirty="0"/>
+              <a:t> J., </a:t>
+            </a:r>
+            <a:r>
+              <a:rPr lang="en-US" sz="1200" dirty="0" err="1"/>
+              <a:t>Eggert</a:t>
+            </a:r>
+            <a:r>
+              <a:rPr lang="en-US" sz="1200" dirty="0"/>
+              <a:t> L., </a:t>
+            </a:r>
+            <a:r>
+              <a:rPr lang="en-US" sz="1200" dirty="0">
+                <a:latin typeface="Consolas"/>
+                <a:cs typeface="Consolas"/>
               </a:rPr>
-              <a:t>OWD: 100ms</a:t>
-            </a:r>
-            <a:endParaRPr lang="en-US" dirty="0">
-              <a:solidFill>
-                <a:srgbClr val="FF6600"/>
-              </a:solidFill>
-            </a:endParaRPr>
+              <a:t>Congestion Control using FEC for Conversational </a:t>
+            </a:r>
+            <a:r>
+              <a:rPr lang="en-US" sz="1200" dirty="0" smtClean="0">
+                <a:latin typeface="Consolas"/>
+                <a:cs typeface="Consolas"/>
+              </a:rPr>
+              <a:t>Multimedia Communication</a:t>
+            </a:r>
+            <a:r>
+              <a:rPr lang="en-US" sz="1200" dirty="0"/>
+              <a:t>, Proc. of ACM Multimedia Systems, Singapore, SG, Mar, 2014,</a:t>
+            </a:r>
+            <a:endParaRPr lang="en-US" sz="1400" dirty="0"/>
           </a:p>
         </p:txBody>
       </p:sp>
     </p:spTree>
     <p:extLst>
       <p:ext uri="{BB962C8B-B14F-4D97-AF65-F5344CB8AC3E}">
-        <p14:creationId xmlns:p14="http://schemas.microsoft.com/office/powerpoint/2010/main" val="1200116518"/>
+        <p14:creationId xmlns:p14="http://schemas.microsoft.com/office/powerpoint/2010/main" val="1187535467"/>
       </p:ext>
     </p:extLst>
   </p:cSld>
@@ -4459,7 +4603,7 @@
       </p:grpSpPr>
       <p:sp>
         <p:nvSpPr>
-          <p:cNvPr id="2" name="Title 1"/>
+          <p:cNvPr id="4" name="Title 3"/>
           <p:cNvSpPr>
             <a:spLocks noGrp="1"/>
           </p:cNvSpPr>
@@ -4472,13 +4616,44 @@
           <a:bodyPr/>
           <a:lstStyle/>
           <a:p>
-            <a:r>
-              <a:rPr lang="en-US" dirty="0"/>
-              <a:t>Evaluation </a:t>
-            </a:r>
+            <a:pPr algn="ctr"/>
             <a:r>
               <a:rPr lang="en-US" dirty="0" smtClean="0"/>
-              <a:t>(3/3)</a:t>
+              <a:t>Evaluation (1/3)</a:t>
+            </a:r>
+            <a:endParaRPr lang="en-US" dirty="0"/>
+          </a:p>
+        </p:txBody>
+      </p:sp>
+      <p:sp>
+        <p:nvSpPr>
+          <p:cNvPr id="3" name="TextBox 2"/>
+          <p:cNvSpPr txBox="1"/>
+          <p:nvPr/>
+        </p:nvSpPr>
+        <p:spPr>
+          <a:xfrm>
+            <a:off x="325027" y="6371213"/>
+            <a:ext cx="6878806" cy="369332"/>
+          </a:xfrm>
+          <a:prstGeom prst="rect">
+            <a:avLst/>
+          </a:prstGeom>
+          <a:noFill/>
+        </p:spPr>
+        <p:txBody>
+          <a:bodyPr wrap="none" rtlCol="0">
+            <a:spAutoFit/>
+          </a:bodyPr>
+          <a:lstStyle/>
+          <a:p>
+            <a:pPr marL="285750" indent="-285750">
+              <a:buFont typeface="Arial"/>
+              <a:buChar char="•"/>
+            </a:pPr>
+            <a:r>
+              <a:rPr lang="en-US" dirty="0" smtClean="0"/>
+              <a:t>Ns-2 simulation, Variable link capacity, Single flow on the link</a:t>
             </a:r>
             <a:endParaRPr lang="en-US" dirty="0"/>
           </a:p>
@@ -4486,14 +4661,14 @@
       </p:sp>
       <p:pic>
         <p:nvPicPr>
-          <p:cNvPr id="4" name="Picture 3" descr="ns-var-240ms-2.pdf"/>
+          <p:cNvPr id="10" name="Picture 9" descr="ns-var-50ms-2.pdf"/>
           <p:cNvPicPr>
             <a:picLocks noChangeAspect="1"/>
           </p:cNvPicPr>
           <p:nvPr/>
         </p:nvPicPr>
         <p:blipFill>
-          <a:blip r:embed="rId2">
+          <a:blip r:embed="rId3">
             <a:extLst>
               <a:ext uri="{28A0092B-C50C-407E-A947-70E740481C1C}">
                 <a14:useLocalDpi xmlns:a14="http://schemas.microsoft.com/office/drawing/2010/main" val="0"/>
@@ -4516,14 +4691,14 @@
       </p:pic>
       <p:sp>
         <p:nvSpPr>
-          <p:cNvPr id="5" name="TextBox 4"/>
+          <p:cNvPr id="11" name="TextBox 10"/>
           <p:cNvSpPr txBox="1"/>
           <p:nvPr/>
         </p:nvSpPr>
         <p:spPr>
           <a:xfrm>
-            <a:off x="1052350" y="1688453"/>
-            <a:ext cx="1646758" cy="369332"/>
+            <a:off x="1420160" y="1688453"/>
+            <a:ext cx="1505540" cy="369332"/>
           </a:xfrm>
           <a:prstGeom prst="rect">
             <a:avLst/>
@@ -4542,7 +4717,7 @@
                   <a:srgbClr val="FF6600"/>
                 </a:solidFill>
               </a:rPr>
-              <a:t>OWD: 240ms</a:t>
+              <a:t>OWD: 50ms</a:t>
             </a:r>
             <a:endParaRPr lang="en-US" dirty="0">
               <a:solidFill>
@@ -4555,13 +4730,20 @@
     </p:spTree>
     <p:extLst>
       <p:ext uri="{BB962C8B-B14F-4D97-AF65-F5344CB8AC3E}">
-        <p14:creationId xmlns:p14="http://schemas.microsoft.com/office/powerpoint/2010/main" val="907757059"/>
+        <p14:creationId xmlns:p14="http://schemas.microsoft.com/office/powerpoint/2010/main" val="1759177461"/>
       </p:ext>
     </p:extLst>
   </p:cSld>
   <p:clrMapOvr>
     <a:masterClrMapping/>
   </p:clrMapOvr>
+  <p:timing>
+    <p:tnLst>
+      <p:par>
+        <p:cTn xmlns:p14="http://schemas.microsoft.com/office/powerpoint/2010/main" id="1" dur="indefinite" restart="never" nodeType="tmRoot"/>
+      </p:par>
+    </p:tnLst>
+  </p:timing>
 </p:sld>
 </file>
 
@@ -4598,8 +4780,12 @@
           <a:lstStyle/>
           <a:p>
             <a:r>
+              <a:rPr lang="en-US" dirty="0"/>
+              <a:t>Evaluation </a:t>
+            </a:r>
+            <a:r>
               <a:rPr lang="en-US" dirty="0" smtClean="0"/>
-              <a:t>Compete with short TCPs</a:t>
+              <a:t>(2/3)</a:t>
             </a:r>
             <a:endParaRPr lang="en-US" dirty="0"/>
           </a:p>
@@ -4607,7 +4793,7 @@
       </p:sp>
       <p:pic>
         <p:nvPicPr>
-          <p:cNvPr id="6" name="Picture 5" descr="ns-competition-100ms-2.pdf"/>
+          <p:cNvPr id="3" name="Picture 2" descr="ns-var-100ms-2.pdf"/>
           <p:cNvPicPr>
             <a:picLocks noChangeAspect="1"/>
           </p:cNvPicPr>
@@ -4627,7 +4813,7 @@
         </p:blipFill>
         <p:spPr>
           <a:xfrm>
-            <a:off x="436960" y="1657890"/>
+            <a:off x="0" y="1417638"/>
             <a:ext cx="9144000" cy="4572000"/>
           </a:xfrm>
           <a:prstGeom prst="rect">
@@ -4635,40 +4821,48 @@
           </a:prstGeom>
         </p:spPr>
       </p:pic>
-      <p:pic>
-        <p:nvPicPr>
-          <p:cNvPr id="7" name="Picture 6" descr="Screen Shot 2014-07-24 at 06.42.22.png"/>
-          <p:cNvPicPr>
-            <a:picLocks noChangeAspect="1"/>
-          </p:cNvPicPr>
-          <p:nvPr/>
-        </p:nvPicPr>
-        <p:blipFill>
-          <a:blip r:embed="rId3">
-            <a:extLst>
-              <a:ext uri="{28A0092B-C50C-407E-A947-70E740481C1C}">
-                <a14:useLocalDpi xmlns:a14="http://schemas.microsoft.com/office/drawing/2010/main" val="0"/>
-              </a:ext>
-            </a:extLst>
-          </a:blip>
-          <a:stretch>
-            <a:fillRect/>
-          </a:stretch>
-        </p:blipFill>
-        <p:spPr>
-          <a:xfrm>
-            <a:off x="0" y="1605169"/>
-            <a:ext cx="1413355" cy="4268332"/>
+      <p:sp>
+        <p:nvSpPr>
+          <p:cNvPr id="4" name="TextBox 3"/>
+          <p:cNvSpPr txBox="1"/>
+          <p:nvPr/>
+        </p:nvSpPr>
+        <p:spPr>
+          <a:xfrm>
+            <a:off x="1031015" y="1688453"/>
+            <a:ext cx="1582484" cy="369332"/>
           </a:xfrm>
           <a:prstGeom prst="rect">
             <a:avLst/>
           </a:prstGeom>
-        </p:spPr>
-      </p:pic>
+          <a:noFill/>
+        </p:spPr>
+        <p:txBody>
+          <a:bodyPr wrap="none" rtlCol="0">
+            <a:spAutoFit/>
+          </a:bodyPr>
+          <a:lstStyle/>
+          <a:p>
+            <a:r>
+              <a:rPr lang="en-US" dirty="0" smtClean="0">
+                <a:solidFill>
+                  <a:srgbClr val="FF6600"/>
+                </a:solidFill>
+              </a:rPr>
+              <a:t>OWD: 100ms</a:t>
+            </a:r>
+            <a:endParaRPr lang="en-US" dirty="0">
+              <a:solidFill>
+                <a:srgbClr val="FF6600"/>
+              </a:solidFill>
+            </a:endParaRPr>
+          </a:p>
+        </p:txBody>
+      </p:sp>
     </p:spTree>
     <p:extLst>
       <p:ext uri="{BB962C8B-B14F-4D97-AF65-F5344CB8AC3E}">
-        <p14:creationId xmlns:p14="http://schemas.microsoft.com/office/powerpoint/2010/main" val="937906483"/>
+        <p14:creationId xmlns:p14="http://schemas.microsoft.com/office/powerpoint/2010/main" val="1200116518"/>
       </p:ext>
     </p:extLst>
   </p:cSld>
@@ -4697,7 +4891,7 @@
       </p:grpSpPr>
       <p:sp>
         <p:nvSpPr>
-          <p:cNvPr id="4" name="Title 3"/>
+          <p:cNvPr id="2" name="Title 1"/>
           <p:cNvSpPr>
             <a:spLocks noGrp="1"/>
           </p:cNvSpPr>
@@ -4710,90 +4904,28 @@
           <a:bodyPr/>
           <a:lstStyle/>
           <a:p>
-            <a:pPr algn="ctr"/>
+            <a:r>
+              <a:rPr lang="en-US" dirty="0"/>
+              <a:t>Evaluation </a:t>
+            </a:r>
             <a:r>
               <a:rPr lang="en-US" dirty="0" smtClean="0"/>
-              <a:t>TESTBED Evaluation (1/2)</a:t>
+              <a:t>(3/3)</a:t>
             </a:r>
             <a:endParaRPr lang="en-US" dirty="0"/>
-          </a:p>
-        </p:txBody>
-      </p:sp>
-      <p:sp>
-        <p:nvSpPr>
-          <p:cNvPr id="3" name="TextBox 2"/>
-          <p:cNvSpPr txBox="1"/>
-          <p:nvPr/>
-        </p:nvSpPr>
-        <p:spPr>
-          <a:xfrm>
-            <a:off x="284061" y="6387304"/>
-            <a:ext cx="6912337" cy="369332"/>
-          </a:xfrm>
-          <a:prstGeom prst="rect">
-            <a:avLst/>
-          </a:prstGeom>
-          <a:noFill/>
-        </p:spPr>
-        <p:txBody>
-          <a:bodyPr wrap="square" rtlCol="0">
-            <a:spAutoFit/>
-          </a:bodyPr>
-          <a:lstStyle/>
-          <a:p>
-            <a:pPr marL="285750" indent="-285750">
-              <a:buFont typeface="Arial"/>
-              <a:buChar char="•"/>
-            </a:pPr>
-            <a:r>
-              <a:rPr lang="en-US" dirty="0" smtClean="0"/>
-              <a:t>1Mbit/s link capacity, 50ms one-way-delay, </a:t>
-            </a:r>
-          </a:p>
-        </p:txBody>
-      </p:sp>
-      <p:sp>
-        <p:nvSpPr>
-          <p:cNvPr id="2" name="Rectangle 1"/>
-          <p:cNvSpPr/>
-          <p:nvPr/>
-        </p:nvSpPr>
-        <p:spPr>
-          <a:xfrm>
-            <a:off x="284061" y="1232972"/>
-            <a:ext cx="2890535" cy="369332"/>
-          </a:xfrm>
-          <a:prstGeom prst="rect">
-            <a:avLst/>
-          </a:prstGeom>
-        </p:spPr>
-        <p:txBody>
-          <a:bodyPr wrap="none">
-            <a:spAutoFit/>
-          </a:bodyPr>
-          <a:lstStyle/>
-          <a:p>
-            <a:r>
-              <a:rPr lang="en-US" dirty="0">
-                <a:solidFill>
-                  <a:srgbClr val="FF6600"/>
-                </a:solidFill>
-              </a:rPr>
-              <a:t>Two RTP flows on the link</a:t>
-            </a:r>
           </a:p>
         </p:txBody>
       </p:sp>
       <p:pic>
         <p:nvPicPr>
-          <p:cNvPr id="6" name="Picture 5" descr="dummynet-50ms-2.pdf"/>
+          <p:cNvPr id="4" name="Picture 3" descr="ns-var-240ms-2.pdf"/>
           <p:cNvPicPr>
             <a:picLocks noChangeAspect="1"/>
           </p:cNvPicPr>
           <p:nvPr/>
         </p:nvPicPr>
         <p:blipFill>
-          <a:blip r:embed="rId3">
+          <a:blip r:embed="rId2">
             <a:extLst>
               <a:ext uri="{28A0092B-C50C-407E-A947-70E740481C1C}">
                 <a14:useLocalDpi xmlns:a14="http://schemas.microsoft.com/office/drawing/2010/main" val="0"/>
@@ -4806,7 +4938,7 @@
         </p:blipFill>
         <p:spPr>
           <a:xfrm>
-            <a:off x="0" y="1624134"/>
+            <a:off x="0" y="1417638"/>
             <a:ext cx="9144000" cy="4572000"/>
           </a:xfrm>
           <a:prstGeom prst="rect">
@@ -4814,23 +4946,54 @@
           </a:prstGeom>
         </p:spPr>
       </p:pic>
+      <p:sp>
+        <p:nvSpPr>
+          <p:cNvPr id="5" name="TextBox 4"/>
+          <p:cNvSpPr txBox="1"/>
+          <p:nvPr/>
+        </p:nvSpPr>
+        <p:spPr>
+          <a:xfrm>
+            <a:off x="1052350" y="1688453"/>
+            <a:ext cx="1646758" cy="369332"/>
+          </a:xfrm>
+          <a:prstGeom prst="rect">
+            <a:avLst/>
+          </a:prstGeom>
+          <a:noFill/>
+        </p:spPr>
+        <p:txBody>
+          <a:bodyPr wrap="none" rtlCol="0">
+            <a:spAutoFit/>
+          </a:bodyPr>
+          <a:lstStyle/>
+          <a:p>
+            <a:r>
+              <a:rPr lang="en-US" dirty="0" smtClean="0">
+                <a:solidFill>
+                  <a:srgbClr val="FF6600"/>
+                </a:solidFill>
+              </a:rPr>
+              <a:t>OWD: 240ms</a:t>
+            </a:r>
+            <a:endParaRPr lang="en-US" dirty="0">
+              <a:solidFill>
+                <a:srgbClr val="FF6600"/>
+              </a:solidFill>
+            </a:endParaRPr>
+          </a:p>
+        </p:txBody>
+      </p:sp>
     </p:spTree>
     <p:extLst>
       <p:ext uri="{BB962C8B-B14F-4D97-AF65-F5344CB8AC3E}">
-        <p14:creationId xmlns:p14="http://schemas.microsoft.com/office/powerpoint/2010/main" val="2899174397"/>
+        <p14:creationId xmlns:p14="http://schemas.microsoft.com/office/powerpoint/2010/main" val="907757059"/>
       </p:ext>
     </p:extLst>
   </p:cSld>
   <p:clrMapOvr>
     <a:masterClrMapping/>
   </p:clrMapOvr>
-  <p:timing>
-    <p:tnLst>
-      <p:par>
-        <p:cTn xmlns:p14="http://schemas.microsoft.com/office/powerpoint/2010/main" id="1" dur="indefinite" restart="never" nodeType="tmRoot"/>
-      </p:par>
-    </p:tnLst>
-  </p:timing>
 </p:sld>
 </file>
 
@@ -4867,27 +5030,22 @@
           <a:lstStyle/>
           <a:p>
             <a:r>
-              <a:rPr lang="en-US" dirty="0"/>
-              <a:t>TESTBED Evaluation </a:t>
-            </a:r>
-            <a:r>
               <a:rPr lang="en-US" dirty="0" smtClean="0"/>
-              <a:t>(2/</a:t>
-            </a:r>
-            <a:r>
-              <a:rPr lang="en-US" dirty="0"/>
-              <a:t>2)</a:t>
-            </a:r>
+              <a:t>50ms</a:t>
+            </a:r>
+            <a:endParaRPr lang="en-US" dirty="0"/>
           </a:p>
         </p:txBody>
       </p:sp>
       <p:pic>
         <p:nvPicPr>
-          <p:cNvPr id="4" name="Picture 3" descr="dummynet-100ms-2.pdf"/>
+          <p:cNvPr id="4" name="Content Placeholder 3" descr="ns-var-50ms-thr.pdf"/>
           <p:cNvPicPr>
-            <a:picLocks noChangeAspect="1"/>
+            <a:picLocks noGrp="1" noChangeAspect="1"/>
           </p:cNvPicPr>
-          <p:nvPr/>
+          <p:nvPr>
+            <p:ph idx="1"/>
+          </p:nvPr>
         </p:nvPicPr>
         <p:blipFill>
           <a:blip r:embed="rId2">
@@ -4897,57 +5055,173 @@
               </a:ext>
             </a:extLst>
           </a:blip>
+          <a:srcRect t="-4996" b="-4996"/>
           <a:stretch>
             <a:fillRect/>
           </a:stretch>
         </p:blipFill>
-        <p:spPr>
-          <a:xfrm>
-            <a:off x="0" y="1616921"/>
-            <a:ext cx="9144000" cy="4572000"/>
-          </a:xfrm>
-          <a:prstGeom prst="rect">
-            <a:avLst/>
-          </a:prstGeom>
-        </p:spPr>
+        <p:spPr/>
       </p:pic>
-      <p:sp>
-        <p:nvSpPr>
-          <p:cNvPr id="5" name="TextBox 4"/>
-          <p:cNvSpPr txBox="1"/>
-          <p:nvPr/>
-        </p:nvSpPr>
-        <p:spPr>
-          <a:xfrm>
-            <a:off x="284061" y="6387304"/>
-            <a:ext cx="6912337" cy="369332"/>
-          </a:xfrm>
-          <a:prstGeom prst="rect">
-            <a:avLst/>
-          </a:prstGeom>
-          <a:noFill/>
-        </p:spPr>
-        <p:txBody>
-          <a:bodyPr wrap="square" rtlCol="0">
-            <a:spAutoFit/>
-          </a:bodyPr>
-          <a:lstStyle/>
-          <a:p>
-            <a:pPr marL="285750" indent="-285750">
-              <a:buFont typeface="Arial"/>
-              <a:buChar char="•"/>
-            </a:pPr>
-            <a:r>
-              <a:rPr lang="en-US" dirty="0" smtClean="0"/>
-              <a:t>1Mbit/s link capacity, 100ms one-way-delay, </a:t>
-            </a:r>
-          </a:p>
-        </p:txBody>
-      </p:sp>
     </p:spTree>
     <p:extLst>
       <p:ext uri="{BB962C8B-B14F-4D97-AF65-F5344CB8AC3E}">
-        <p14:creationId xmlns:p14="http://schemas.microsoft.com/office/powerpoint/2010/main" val="373164913"/>
+        <p14:creationId xmlns:p14="http://schemas.microsoft.com/office/powerpoint/2010/main" val="1383183988"/>
+      </p:ext>
+    </p:extLst>
+  </p:cSld>
+  <p:clrMapOvr>
+    <a:masterClrMapping/>
+  </p:clrMapOvr>
+</p:sld>
+</file>
+
+<file path=ppt/slides/slide18.xml><?xml version="1.0" encoding="utf-8"?>
+<p:sld xmlns:a="http://schemas.openxmlformats.org/drawingml/2006/main" xmlns:r="http://schemas.openxmlformats.org/officeDocument/2006/relationships" xmlns:p="http://schemas.openxmlformats.org/presentationml/2006/main">
+  <p:cSld>
+    <p:spTree>
+      <p:nvGrpSpPr>
+        <p:cNvPr id="1" name=""/>
+        <p:cNvGrpSpPr/>
+        <p:nvPr/>
+      </p:nvGrpSpPr>
+      <p:grpSpPr>
+        <a:xfrm>
+          <a:off x="0" y="0"/>
+          <a:ext cx="0" cy="0"/>
+          <a:chOff x="0" y="0"/>
+          <a:chExt cx="0" cy="0"/>
+        </a:xfrm>
+      </p:grpSpPr>
+      <p:sp>
+        <p:nvSpPr>
+          <p:cNvPr id="2" name="Title 1"/>
+          <p:cNvSpPr>
+            <a:spLocks noGrp="1"/>
+          </p:cNvSpPr>
+          <p:nvPr>
+            <p:ph type="title"/>
+          </p:nvPr>
+        </p:nvSpPr>
+        <p:spPr/>
+        <p:txBody>
+          <a:bodyPr/>
+          <a:lstStyle/>
+          <a:p>
+            <a:r>
+              <a:rPr lang="en-US" dirty="0" smtClean="0"/>
+              <a:t>50ms</a:t>
+            </a:r>
+            <a:endParaRPr lang="en-US" dirty="0"/>
+          </a:p>
+        </p:txBody>
+      </p:sp>
+      <p:pic>
+        <p:nvPicPr>
+          <p:cNvPr id="4" name="Content Placeholder 3" descr="ns-var-50ms-delay.pdf"/>
+          <p:cNvPicPr>
+            <a:picLocks noGrp="1" noChangeAspect="1"/>
+          </p:cNvPicPr>
+          <p:nvPr>
+            <p:ph idx="1"/>
+          </p:nvPr>
+        </p:nvPicPr>
+        <p:blipFill>
+          <a:blip r:embed="rId2">
+            <a:extLst>
+              <a:ext uri="{28A0092B-C50C-407E-A947-70E740481C1C}">
+                <a14:useLocalDpi xmlns:a14="http://schemas.microsoft.com/office/drawing/2010/main" val="0"/>
+              </a:ext>
+            </a:extLst>
+          </a:blip>
+          <a:srcRect t="-4996" b="-4996"/>
+          <a:stretch>
+            <a:fillRect/>
+          </a:stretch>
+        </p:blipFill>
+        <p:spPr/>
+      </p:pic>
+    </p:spTree>
+    <p:extLst>
+      <p:ext uri="{BB962C8B-B14F-4D97-AF65-F5344CB8AC3E}">
+        <p14:creationId xmlns:p14="http://schemas.microsoft.com/office/powerpoint/2010/main" val="2034122513"/>
+      </p:ext>
+    </p:extLst>
+  </p:cSld>
+  <p:clrMapOvr>
+    <a:masterClrMapping/>
+  </p:clrMapOvr>
+</p:sld>
+</file>
+
+<file path=ppt/slides/slide19.xml><?xml version="1.0" encoding="utf-8"?>
+<p:sld xmlns:a="http://schemas.openxmlformats.org/drawingml/2006/main" xmlns:r="http://schemas.openxmlformats.org/officeDocument/2006/relationships" xmlns:p="http://schemas.openxmlformats.org/presentationml/2006/main">
+  <p:cSld>
+    <p:spTree>
+      <p:nvGrpSpPr>
+        <p:cNvPr id="1" name=""/>
+        <p:cNvGrpSpPr/>
+        <p:nvPr/>
+      </p:nvGrpSpPr>
+      <p:grpSpPr>
+        <a:xfrm>
+          <a:off x="0" y="0"/>
+          <a:ext cx="0" cy="0"/>
+          <a:chOff x="0" y="0"/>
+          <a:chExt cx="0" cy="0"/>
+        </a:xfrm>
+      </p:grpSpPr>
+      <p:sp>
+        <p:nvSpPr>
+          <p:cNvPr id="2" name="Title 1"/>
+          <p:cNvSpPr>
+            <a:spLocks noGrp="1"/>
+          </p:cNvSpPr>
+          <p:nvPr>
+            <p:ph type="title"/>
+          </p:nvPr>
+        </p:nvSpPr>
+        <p:spPr/>
+        <p:txBody>
+          <a:bodyPr/>
+          <a:lstStyle/>
+          <a:p>
+            <a:r>
+              <a:rPr lang="en-US" dirty="0" smtClean="0"/>
+              <a:t>100ms</a:t>
+            </a:r>
+            <a:endParaRPr lang="en-US" dirty="0"/>
+          </a:p>
+        </p:txBody>
+      </p:sp>
+      <p:pic>
+        <p:nvPicPr>
+          <p:cNvPr id="4" name="Content Placeholder 3" descr="ns-var-100ms-thr.pdf"/>
+          <p:cNvPicPr>
+            <a:picLocks noGrp="1" noChangeAspect="1"/>
+          </p:cNvPicPr>
+          <p:nvPr>
+            <p:ph idx="1"/>
+          </p:nvPr>
+        </p:nvPicPr>
+        <p:blipFill>
+          <a:blip r:embed="rId2">
+            <a:extLst>
+              <a:ext uri="{28A0092B-C50C-407E-A947-70E740481C1C}">
+                <a14:useLocalDpi xmlns:a14="http://schemas.microsoft.com/office/drawing/2010/main" val="0"/>
+              </a:ext>
+            </a:extLst>
+          </a:blip>
+          <a:srcRect t="-4996" b="-4996"/>
+          <a:stretch>
+            <a:fillRect/>
+          </a:stretch>
+        </p:blipFill>
+        <p:spPr/>
+      </p:pic>
+    </p:spTree>
+    <p:extLst>
+      <p:ext uri="{BB962C8B-B14F-4D97-AF65-F5344CB8AC3E}">
+        <p14:creationId xmlns:p14="http://schemas.microsoft.com/office/powerpoint/2010/main" val="1136204036"/>
       </p:ext>
     </p:extLst>
   </p:cSld>
@@ -5014,58 +5288,27 @@
           <a:p>
             <a:r>
               <a:rPr lang="en-US" dirty="0" smtClean="0"/>
-              <a:t>Lars made a 3</a:t>
-            </a:r>
-            <a:r>
-              <a:rPr lang="en-US" baseline="30000" dirty="0" smtClean="0"/>
-              <a:t>rd</a:t>
-            </a:r>
+              <a:t>2 IPR disclosures</a:t>
+            </a:r>
+          </a:p>
+          <a:p>
+            <a:pPr lvl="1"/>
             <a:r>
               <a:rPr lang="en-US" dirty="0" smtClean="0"/>
-              <a:t> party disclosure:</a:t>
+              <a:t>Nokia</a:t>
             </a:r>
           </a:p>
           <a:p>
             <a:pPr lvl="1"/>
             <a:r>
-              <a:rPr lang="pl-PL" dirty="0">
-                <a:hlinkClick r:id="rId2"/>
-              </a:rPr>
-              <a:t>https://datatracker.ietf.org/ipr/2394</a:t>
-            </a:r>
-            <a:r>
-              <a:rPr lang="pl-PL" dirty="0" smtClean="0">
-                <a:hlinkClick r:id="rId2"/>
-              </a:rPr>
-              <a:t>/</a:t>
-            </a:r>
-            <a:r>
-              <a:rPr lang="pl-PL" dirty="0" smtClean="0"/>
-              <a:t> </a:t>
-            </a:r>
+              <a:rPr lang="en-US" dirty="0" err="1" smtClean="0"/>
+              <a:t>Polycom</a:t>
+            </a:r>
+            <a:endParaRPr lang="en-US" dirty="0" smtClean="0"/>
           </a:p>
           <a:p>
             <a:pPr lvl="1"/>
-            <a:r>
-              <a:rPr lang="en-US" dirty="0" smtClean="0"/>
-              <a:t>A</a:t>
-            </a:r>
-            <a:r>
-              <a:rPr lang="pl-PL" dirty="0" err="1" smtClean="0"/>
-              <a:t>lso</a:t>
-            </a:r>
-            <a:r>
-              <a:rPr lang="pl-PL" dirty="0" smtClean="0"/>
-              <a:t> </a:t>
-            </a:r>
-            <a:r>
-              <a:rPr lang="pl-PL" dirty="0" err="1" smtClean="0"/>
-              <a:t>sent</a:t>
-            </a:r>
-            <a:r>
-              <a:rPr lang="pl-PL" dirty="0" smtClean="0"/>
-              <a:t> to the mailing list</a:t>
-            </a:r>
+            <a:endParaRPr lang="pl-PL" dirty="0" smtClean="0"/>
           </a:p>
           <a:p>
             <a:endParaRPr lang="pl-PL" dirty="0"/>
@@ -5076,6 +5319,955 @@
     <p:extLst>
       <p:ext uri="{BB962C8B-B14F-4D97-AF65-F5344CB8AC3E}">
         <p14:creationId xmlns:p14="http://schemas.microsoft.com/office/powerpoint/2010/main" val="247030305"/>
+      </p:ext>
+    </p:extLst>
+  </p:cSld>
+  <p:clrMapOvr>
+    <a:masterClrMapping/>
+  </p:clrMapOvr>
+</p:sld>
+</file>
+
+<file path=ppt/slides/slide20.xml><?xml version="1.0" encoding="utf-8"?>
+<p:sld xmlns:a="http://schemas.openxmlformats.org/drawingml/2006/main" xmlns:r="http://schemas.openxmlformats.org/officeDocument/2006/relationships" xmlns:p="http://schemas.openxmlformats.org/presentationml/2006/main">
+  <p:cSld>
+    <p:spTree>
+      <p:nvGrpSpPr>
+        <p:cNvPr id="1" name=""/>
+        <p:cNvGrpSpPr/>
+        <p:nvPr/>
+      </p:nvGrpSpPr>
+      <p:grpSpPr>
+        <a:xfrm>
+          <a:off x="0" y="0"/>
+          <a:ext cx="0" cy="0"/>
+          <a:chOff x="0" y="0"/>
+          <a:chExt cx="0" cy="0"/>
+        </a:xfrm>
+      </p:grpSpPr>
+      <p:sp>
+        <p:nvSpPr>
+          <p:cNvPr id="2" name="Title 1"/>
+          <p:cNvSpPr>
+            <a:spLocks noGrp="1"/>
+          </p:cNvSpPr>
+          <p:nvPr>
+            <p:ph type="title"/>
+          </p:nvPr>
+        </p:nvSpPr>
+        <p:spPr/>
+        <p:txBody>
+          <a:bodyPr/>
+          <a:lstStyle/>
+          <a:p>
+            <a:r>
+              <a:rPr lang="en-US" dirty="0" smtClean="0"/>
+              <a:t>100ms</a:t>
+            </a:r>
+            <a:endParaRPr lang="en-US" dirty="0"/>
+          </a:p>
+        </p:txBody>
+      </p:sp>
+      <p:pic>
+        <p:nvPicPr>
+          <p:cNvPr id="4" name="Content Placeholder 3" descr="ns-var-100ms-delay.pdf"/>
+          <p:cNvPicPr>
+            <a:picLocks noGrp="1" noChangeAspect="1"/>
+          </p:cNvPicPr>
+          <p:nvPr>
+            <p:ph idx="1"/>
+          </p:nvPr>
+        </p:nvPicPr>
+        <p:blipFill>
+          <a:blip r:embed="rId2">
+            <a:extLst>
+              <a:ext uri="{28A0092B-C50C-407E-A947-70E740481C1C}">
+                <a14:useLocalDpi xmlns:a14="http://schemas.microsoft.com/office/drawing/2010/main" val="0"/>
+              </a:ext>
+            </a:extLst>
+          </a:blip>
+          <a:srcRect t="-4996" b="-4996"/>
+          <a:stretch>
+            <a:fillRect/>
+          </a:stretch>
+        </p:blipFill>
+        <p:spPr/>
+      </p:pic>
+    </p:spTree>
+    <p:extLst>
+      <p:ext uri="{BB962C8B-B14F-4D97-AF65-F5344CB8AC3E}">
+        <p14:creationId xmlns:p14="http://schemas.microsoft.com/office/powerpoint/2010/main" val="1236070349"/>
+      </p:ext>
+    </p:extLst>
+  </p:cSld>
+  <p:clrMapOvr>
+    <a:masterClrMapping/>
+  </p:clrMapOvr>
+</p:sld>
+</file>
+
+<file path=ppt/slides/slide21.xml><?xml version="1.0" encoding="utf-8"?>
+<p:sld xmlns:a="http://schemas.openxmlformats.org/drawingml/2006/main" xmlns:r="http://schemas.openxmlformats.org/officeDocument/2006/relationships" xmlns:p="http://schemas.openxmlformats.org/presentationml/2006/main">
+  <p:cSld>
+    <p:spTree>
+      <p:nvGrpSpPr>
+        <p:cNvPr id="1" name=""/>
+        <p:cNvGrpSpPr/>
+        <p:nvPr/>
+      </p:nvGrpSpPr>
+      <p:grpSpPr>
+        <a:xfrm>
+          <a:off x="0" y="0"/>
+          <a:ext cx="0" cy="0"/>
+          <a:chOff x="0" y="0"/>
+          <a:chExt cx="0" cy="0"/>
+        </a:xfrm>
+      </p:grpSpPr>
+      <p:sp>
+        <p:nvSpPr>
+          <p:cNvPr id="2" name="Title 1"/>
+          <p:cNvSpPr>
+            <a:spLocks noGrp="1"/>
+          </p:cNvSpPr>
+          <p:nvPr>
+            <p:ph type="title"/>
+          </p:nvPr>
+        </p:nvSpPr>
+        <p:spPr/>
+        <p:txBody>
+          <a:bodyPr/>
+          <a:lstStyle/>
+          <a:p>
+            <a:r>
+              <a:rPr lang="en-US" dirty="0" smtClean="0"/>
+              <a:t>RTT fairness (50ms)</a:t>
+            </a:r>
+            <a:endParaRPr lang="en-US" dirty="0"/>
+          </a:p>
+        </p:txBody>
+      </p:sp>
+      <p:pic>
+        <p:nvPicPr>
+          <p:cNvPr id="4" name="Content Placeholder 3" descr="competing-flows-50ms-thr.pdf"/>
+          <p:cNvPicPr>
+            <a:picLocks noGrp="1" noChangeAspect="1"/>
+          </p:cNvPicPr>
+          <p:nvPr>
+            <p:ph idx="1"/>
+          </p:nvPr>
+        </p:nvPicPr>
+        <p:blipFill>
+          <a:blip r:embed="rId2">
+            <a:extLst>
+              <a:ext uri="{28A0092B-C50C-407E-A947-70E740481C1C}">
+                <a14:useLocalDpi xmlns:a14="http://schemas.microsoft.com/office/drawing/2010/main" val="0"/>
+              </a:ext>
+            </a:extLst>
+          </a:blip>
+          <a:srcRect t="-4996" b="-4996"/>
+          <a:stretch>
+            <a:fillRect/>
+          </a:stretch>
+        </p:blipFill>
+        <p:spPr>
+          <a:xfrm>
+            <a:off x="457200" y="1613855"/>
+            <a:ext cx="8229600" cy="4525963"/>
+          </a:xfrm>
+        </p:spPr>
+      </p:pic>
+    </p:spTree>
+    <p:extLst>
+      <p:ext uri="{BB962C8B-B14F-4D97-AF65-F5344CB8AC3E}">
+        <p14:creationId xmlns:p14="http://schemas.microsoft.com/office/powerpoint/2010/main" val="2651311564"/>
+      </p:ext>
+    </p:extLst>
+  </p:cSld>
+  <p:clrMapOvr>
+    <a:masterClrMapping/>
+  </p:clrMapOvr>
+</p:sld>
+</file>
+
+<file path=ppt/slides/slide22.xml><?xml version="1.0" encoding="utf-8"?>
+<p:sld xmlns:a="http://schemas.openxmlformats.org/drawingml/2006/main" xmlns:r="http://schemas.openxmlformats.org/officeDocument/2006/relationships" xmlns:p="http://schemas.openxmlformats.org/presentationml/2006/main">
+  <p:cSld>
+    <p:spTree>
+      <p:nvGrpSpPr>
+        <p:cNvPr id="1" name=""/>
+        <p:cNvGrpSpPr/>
+        <p:nvPr/>
+      </p:nvGrpSpPr>
+      <p:grpSpPr>
+        <a:xfrm>
+          <a:off x="0" y="0"/>
+          <a:ext cx="0" cy="0"/>
+          <a:chOff x="0" y="0"/>
+          <a:chExt cx="0" cy="0"/>
+        </a:xfrm>
+      </p:grpSpPr>
+      <p:sp>
+        <p:nvSpPr>
+          <p:cNvPr id="2" name="Title 1"/>
+          <p:cNvSpPr>
+            <a:spLocks noGrp="1"/>
+          </p:cNvSpPr>
+          <p:nvPr>
+            <p:ph type="title"/>
+          </p:nvPr>
+        </p:nvSpPr>
+        <p:spPr/>
+        <p:txBody>
+          <a:bodyPr/>
+          <a:lstStyle/>
+          <a:p>
+            <a:r>
+              <a:rPr lang="en-US" dirty="0" smtClean="0"/>
+              <a:t>5.4: RTT fairness</a:t>
+            </a:r>
+            <a:endParaRPr lang="en-US" dirty="0"/>
+          </a:p>
+        </p:txBody>
+      </p:sp>
+      <p:pic>
+        <p:nvPicPr>
+          <p:cNvPr id="4" name="Content Placeholder 3" descr="competing-flows-50ms-delay.pdf"/>
+          <p:cNvPicPr>
+            <a:picLocks noGrp="1" noChangeAspect="1"/>
+          </p:cNvPicPr>
+          <p:nvPr>
+            <p:ph idx="1"/>
+          </p:nvPr>
+        </p:nvPicPr>
+        <p:blipFill>
+          <a:blip r:embed="rId2">
+            <a:extLst>
+              <a:ext uri="{28A0092B-C50C-407E-A947-70E740481C1C}">
+                <a14:useLocalDpi xmlns:a14="http://schemas.microsoft.com/office/drawing/2010/main" val="0"/>
+              </a:ext>
+            </a:extLst>
+          </a:blip>
+          <a:srcRect t="-4996" b="-4996"/>
+          <a:stretch>
+            <a:fillRect/>
+          </a:stretch>
+        </p:blipFill>
+        <p:spPr/>
+      </p:pic>
+    </p:spTree>
+    <p:extLst>
+      <p:ext uri="{BB962C8B-B14F-4D97-AF65-F5344CB8AC3E}">
+        <p14:creationId xmlns:p14="http://schemas.microsoft.com/office/powerpoint/2010/main" val="160369259"/>
+      </p:ext>
+    </p:extLst>
+  </p:cSld>
+  <p:clrMapOvr>
+    <a:masterClrMapping/>
+  </p:clrMapOvr>
+</p:sld>
+</file>
+
+<file path=ppt/slides/slide23.xml><?xml version="1.0" encoding="utf-8"?>
+<p:sld xmlns:a="http://schemas.openxmlformats.org/drawingml/2006/main" xmlns:r="http://schemas.openxmlformats.org/officeDocument/2006/relationships" xmlns:p="http://schemas.openxmlformats.org/presentationml/2006/main">
+  <p:cSld>
+    <p:spTree>
+      <p:nvGrpSpPr>
+        <p:cNvPr id="1" name=""/>
+        <p:cNvGrpSpPr/>
+        <p:nvPr/>
+      </p:nvGrpSpPr>
+      <p:grpSpPr>
+        <a:xfrm>
+          <a:off x="0" y="0"/>
+          <a:ext cx="0" cy="0"/>
+          <a:chOff x="0" y="0"/>
+          <a:chExt cx="0" cy="0"/>
+        </a:xfrm>
+      </p:grpSpPr>
+      <p:sp>
+        <p:nvSpPr>
+          <p:cNvPr id="2" name="Title 1"/>
+          <p:cNvSpPr>
+            <a:spLocks noGrp="1"/>
+          </p:cNvSpPr>
+          <p:nvPr>
+            <p:ph type="title"/>
+          </p:nvPr>
+        </p:nvSpPr>
+        <p:spPr/>
+        <p:txBody>
+          <a:bodyPr/>
+          <a:lstStyle/>
+          <a:p>
+            <a:r>
+              <a:rPr lang="en-US" dirty="0"/>
+              <a:t>RTT fairness </a:t>
+            </a:r>
+            <a:r>
+              <a:rPr lang="en-US" dirty="0" smtClean="0"/>
+              <a:t>(100ms</a:t>
+            </a:r>
+            <a:r>
+              <a:rPr lang="en-US" dirty="0"/>
+              <a:t>)</a:t>
+            </a:r>
+          </a:p>
+        </p:txBody>
+      </p:sp>
+      <p:pic>
+        <p:nvPicPr>
+          <p:cNvPr id="4" name="Content Placeholder 3" descr="competing-flows-100ms-thr.pdf"/>
+          <p:cNvPicPr>
+            <a:picLocks noGrp="1" noChangeAspect="1"/>
+          </p:cNvPicPr>
+          <p:nvPr>
+            <p:ph idx="1"/>
+          </p:nvPr>
+        </p:nvPicPr>
+        <p:blipFill>
+          <a:blip r:embed="rId2">
+            <a:extLst>
+              <a:ext uri="{28A0092B-C50C-407E-A947-70E740481C1C}">
+                <a14:useLocalDpi xmlns:a14="http://schemas.microsoft.com/office/drawing/2010/main" val="0"/>
+              </a:ext>
+            </a:extLst>
+          </a:blip>
+          <a:srcRect t="-4996" b="-4996"/>
+          <a:stretch>
+            <a:fillRect/>
+          </a:stretch>
+        </p:blipFill>
+        <p:spPr/>
+      </p:pic>
+    </p:spTree>
+    <p:extLst>
+      <p:ext uri="{BB962C8B-B14F-4D97-AF65-F5344CB8AC3E}">
+        <p14:creationId xmlns:p14="http://schemas.microsoft.com/office/powerpoint/2010/main" val="1875493472"/>
+      </p:ext>
+    </p:extLst>
+  </p:cSld>
+  <p:clrMapOvr>
+    <a:masterClrMapping/>
+  </p:clrMapOvr>
+</p:sld>
+</file>
+
+<file path=ppt/slides/slide24.xml><?xml version="1.0" encoding="utf-8"?>
+<p:sld xmlns:a="http://schemas.openxmlformats.org/drawingml/2006/main" xmlns:r="http://schemas.openxmlformats.org/officeDocument/2006/relationships" xmlns:p="http://schemas.openxmlformats.org/presentationml/2006/main">
+  <p:cSld>
+    <p:spTree>
+      <p:nvGrpSpPr>
+        <p:cNvPr id="1" name=""/>
+        <p:cNvGrpSpPr/>
+        <p:nvPr/>
+      </p:nvGrpSpPr>
+      <p:grpSpPr>
+        <a:xfrm>
+          <a:off x="0" y="0"/>
+          <a:ext cx="0" cy="0"/>
+          <a:chOff x="0" y="0"/>
+          <a:chExt cx="0" cy="0"/>
+        </a:xfrm>
+      </p:grpSpPr>
+      <p:sp>
+        <p:nvSpPr>
+          <p:cNvPr id="2" name="Title 1"/>
+          <p:cNvSpPr>
+            <a:spLocks noGrp="1"/>
+          </p:cNvSpPr>
+          <p:nvPr>
+            <p:ph type="title"/>
+          </p:nvPr>
+        </p:nvSpPr>
+        <p:spPr/>
+        <p:txBody>
+          <a:bodyPr/>
+          <a:lstStyle/>
+          <a:p>
+            <a:r>
+              <a:rPr lang="en-US" dirty="0"/>
+              <a:t>RTT fairness </a:t>
+            </a:r>
+            <a:r>
+              <a:rPr lang="en-US" dirty="0" smtClean="0"/>
+              <a:t>(100ms</a:t>
+            </a:r>
+            <a:r>
+              <a:rPr lang="en-US" dirty="0"/>
+              <a:t>)</a:t>
+            </a:r>
+          </a:p>
+        </p:txBody>
+      </p:sp>
+      <p:pic>
+        <p:nvPicPr>
+          <p:cNvPr id="4" name="Content Placeholder 3" descr="competing-flows-100ms-delay.pdf"/>
+          <p:cNvPicPr>
+            <a:picLocks noGrp="1" noChangeAspect="1"/>
+          </p:cNvPicPr>
+          <p:nvPr>
+            <p:ph idx="1"/>
+          </p:nvPr>
+        </p:nvPicPr>
+        <p:blipFill>
+          <a:blip r:embed="rId2">
+            <a:extLst>
+              <a:ext uri="{28A0092B-C50C-407E-A947-70E740481C1C}">
+                <a14:useLocalDpi xmlns:a14="http://schemas.microsoft.com/office/drawing/2010/main" val="0"/>
+              </a:ext>
+            </a:extLst>
+          </a:blip>
+          <a:srcRect t="-4996" b="-4996"/>
+          <a:stretch>
+            <a:fillRect/>
+          </a:stretch>
+        </p:blipFill>
+        <p:spPr/>
+      </p:pic>
+    </p:spTree>
+    <p:extLst>
+      <p:ext uri="{BB962C8B-B14F-4D97-AF65-F5344CB8AC3E}">
+        <p14:creationId xmlns:p14="http://schemas.microsoft.com/office/powerpoint/2010/main" val="2877344977"/>
+      </p:ext>
+    </p:extLst>
+  </p:cSld>
+  <p:clrMapOvr>
+    <a:masterClrMapping/>
+  </p:clrMapOvr>
+</p:sld>
+</file>
+
+<file path=ppt/slides/slide25.xml><?xml version="1.0" encoding="utf-8"?>
+<p:sld xmlns:a="http://schemas.openxmlformats.org/drawingml/2006/main" xmlns:r="http://schemas.openxmlformats.org/officeDocument/2006/relationships" xmlns:p="http://schemas.openxmlformats.org/presentationml/2006/main">
+  <p:cSld>
+    <p:spTree>
+      <p:nvGrpSpPr>
+        <p:cNvPr id="1" name=""/>
+        <p:cNvGrpSpPr/>
+        <p:nvPr/>
+      </p:nvGrpSpPr>
+      <p:grpSpPr>
+        <a:xfrm>
+          <a:off x="0" y="0"/>
+          <a:ext cx="0" cy="0"/>
+          <a:chOff x="0" y="0"/>
+          <a:chExt cx="0" cy="0"/>
+        </a:xfrm>
+      </p:grpSpPr>
+      <p:sp>
+        <p:nvSpPr>
+          <p:cNvPr id="2" name="Title 1"/>
+          <p:cNvSpPr>
+            <a:spLocks noGrp="1"/>
+          </p:cNvSpPr>
+          <p:nvPr>
+            <p:ph type="title"/>
+          </p:nvPr>
+        </p:nvSpPr>
+        <p:spPr/>
+        <p:txBody>
+          <a:bodyPr/>
+          <a:lstStyle/>
+          <a:p>
+            <a:r>
+              <a:rPr lang="en-US" dirty="0" smtClean="0"/>
+              <a:t>Compete with short TCPs</a:t>
+            </a:r>
+            <a:endParaRPr lang="en-US" dirty="0"/>
+          </a:p>
+        </p:txBody>
+      </p:sp>
+      <p:pic>
+        <p:nvPicPr>
+          <p:cNvPr id="6" name="Picture 5" descr="ns-competition-100ms-2.pdf"/>
+          <p:cNvPicPr>
+            <a:picLocks noChangeAspect="1"/>
+          </p:cNvPicPr>
+          <p:nvPr/>
+        </p:nvPicPr>
+        <p:blipFill>
+          <a:blip r:embed="rId2">
+            <a:extLst>
+              <a:ext uri="{28A0092B-C50C-407E-A947-70E740481C1C}">
+                <a14:useLocalDpi xmlns:a14="http://schemas.microsoft.com/office/drawing/2010/main" val="0"/>
+              </a:ext>
+            </a:extLst>
+          </a:blip>
+          <a:stretch>
+            <a:fillRect/>
+          </a:stretch>
+        </p:blipFill>
+        <p:spPr>
+          <a:xfrm>
+            <a:off x="436960" y="1657890"/>
+            <a:ext cx="9144000" cy="4572000"/>
+          </a:xfrm>
+          <a:prstGeom prst="rect">
+            <a:avLst/>
+          </a:prstGeom>
+        </p:spPr>
+      </p:pic>
+      <p:pic>
+        <p:nvPicPr>
+          <p:cNvPr id="7" name="Picture 6" descr="Screen Shot 2014-07-24 at 06.42.22.png"/>
+          <p:cNvPicPr>
+            <a:picLocks noChangeAspect="1"/>
+          </p:cNvPicPr>
+          <p:nvPr/>
+        </p:nvPicPr>
+        <p:blipFill>
+          <a:blip r:embed="rId3">
+            <a:extLst>
+              <a:ext uri="{28A0092B-C50C-407E-A947-70E740481C1C}">
+                <a14:useLocalDpi xmlns:a14="http://schemas.microsoft.com/office/drawing/2010/main" val="0"/>
+              </a:ext>
+            </a:extLst>
+          </a:blip>
+          <a:stretch>
+            <a:fillRect/>
+          </a:stretch>
+        </p:blipFill>
+        <p:spPr>
+          <a:xfrm>
+            <a:off x="0" y="1605169"/>
+            <a:ext cx="1413355" cy="4268332"/>
+          </a:xfrm>
+          <a:prstGeom prst="rect">
+            <a:avLst/>
+          </a:prstGeom>
+        </p:spPr>
+      </p:pic>
+    </p:spTree>
+    <p:extLst>
+      <p:ext uri="{BB962C8B-B14F-4D97-AF65-F5344CB8AC3E}">
+        <p14:creationId xmlns:p14="http://schemas.microsoft.com/office/powerpoint/2010/main" val="3697305034"/>
+      </p:ext>
+    </p:extLst>
+  </p:cSld>
+  <p:clrMapOvr>
+    <a:masterClrMapping/>
+  </p:clrMapOvr>
+</p:sld>
+</file>
+
+<file path=ppt/slides/slide26.xml><?xml version="1.0" encoding="utf-8"?>
+<p:sld xmlns:a="http://schemas.openxmlformats.org/drawingml/2006/main" xmlns:r="http://schemas.openxmlformats.org/officeDocument/2006/relationships" xmlns:p="http://schemas.openxmlformats.org/presentationml/2006/main">
+  <p:cSld>
+    <p:spTree>
+      <p:nvGrpSpPr>
+        <p:cNvPr id="1" name=""/>
+        <p:cNvGrpSpPr/>
+        <p:nvPr/>
+      </p:nvGrpSpPr>
+      <p:grpSpPr>
+        <a:xfrm>
+          <a:off x="0" y="0"/>
+          <a:ext cx="0" cy="0"/>
+          <a:chOff x="0" y="0"/>
+          <a:chExt cx="0" cy="0"/>
+        </a:xfrm>
+      </p:grpSpPr>
+      <p:sp>
+        <p:nvSpPr>
+          <p:cNvPr id="4" name="Title 3"/>
+          <p:cNvSpPr>
+            <a:spLocks noGrp="1"/>
+          </p:cNvSpPr>
+          <p:nvPr>
+            <p:ph type="title"/>
+          </p:nvPr>
+        </p:nvSpPr>
+        <p:spPr/>
+        <p:txBody>
+          <a:bodyPr/>
+          <a:lstStyle/>
+          <a:p>
+            <a:pPr algn="ctr"/>
+            <a:r>
+              <a:rPr lang="en-US" dirty="0" smtClean="0"/>
+              <a:t>TESTBED Evaluation (1/2)</a:t>
+            </a:r>
+            <a:endParaRPr lang="en-US" dirty="0"/>
+          </a:p>
+        </p:txBody>
+      </p:sp>
+      <p:sp>
+        <p:nvSpPr>
+          <p:cNvPr id="3" name="TextBox 2"/>
+          <p:cNvSpPr txBox="1"/>
+          <p:nvPr/>
+        </p:nvSpPr>
+        <p:spPr>
+          <a:xfrm>
+            <a:off x="284061" y="6387304"/>
+            <a:ext cx="6912337" cy="369332"/>
+          </a:xfrm>
+          <a:prstGeom prst="rect">
+            <a:avLst/>
+          </a:prstGeom>
+          <a:noFill/>
+        </p:spPr>
+        <p:txBody>
+          <a:bodyPr wrap="square" rtlCol="0">
+            <a:spAutoFit/>
+          </a:bodyPr>
+          <a:lstStyle/>
+          <a:p>
+            <a:pPr marL="285750" indent="-285750">
+              <a:buFont typeface="Arial"/>
+              <a:buChar char="•"/>
+            </a:pPr>
+            <a:r>
+              <a:rPr lang="en-US" dirty="0" smtClean="0"/>
+              <a:t>1Mbit/s link capacity, 50ms one-way-delay, </a:t>
+            </a:r>
+          </a:p>
+        </p:txBody>
+      </p:sp>
+      <p:sp>
+        <p:nvSpPr>
+          <p:cNvPr id="2" name="Rectangle 1"/>
+          <p:cNvSpPr/>
+          <p:nvPr/>
+        </p:nvSpPr>
+        <p:spPr>
+          <a:xfrm>
+            <a:off x="284061" y="1232972"/>
+            <a:ext cx="2890535" cy="369332"/>
+          </a:xfrm>
+          <a:prstGeom prst="rect">
+            <a:avLst/>
+          </a:prstGeom>
+        </p:spPr>
+        <p:txBody>
+          <a:bodyPr wrap="none">
+            <a:spAutoFit/>
+          </a:bodyPr>
+          <a:lstStyle/>
+          <a:p>
+            <a:r>
+              <a:rPr lang="en-US" dirty="0">
+                <a:solidFill>
+                  <a:srgbClr val="FF6600"/>
+                </a:solidFill>
+              </a:rPr>
+              <a:t>Two RTP flows on the link</a:t>
+            </a:r>
+          </a:p>
+        </p:txBody>
+      </p:sp>
+      <p:pic>
+        <p:nvPicPr>
+          <p:cNvPr id="6" name="Picture 5" descr="dummynet-50ms-2.pdf"/>
+          <p:cNvPicPr>
+            <a:picLocks noChangeAspect="1"/>
+          </p:cNvPicPr>
+          <p:nvPr/>
+        </p:nvPicPr>
+        <p:blipFill>
+          <a:blip r:embed="rId3">
+            <a:extLst>
+              <a:ext uri="{28A0092B-C50C-407E-A947-70E740481C1C}">
+                <a14:useLocalDpi xmlns:a14="http://schemas.microsoft.com/office/drawing/2010/main" val="0"/>
+              </a:ext>
+            </a:extLst>
+          </a:blip>
+          <a:stretch>
+            <a:fillRect/>
+          </a:stretch>
+        </p:blipFill>
+        <p:spPr>
+          <a:xfrm>
+            <a:off x="0" y="1624134"/>
+            <a:ext cx="9144000" cy="4572000"/>
+          </a:xfrm>
+          <a:prstGeom prst="rect">
+            <a:avLst/>
+          </a:prstGeom>
+        </p:spPr>
+      </p:pic>
+    </p:spTree>
+    <p:extLst>
+      <p:ext uri="{BB962C8B-B14F-4D97-AF65-F5344CB8AC3E}">
+        <p14:creationId xmlns:p14="http://schemas.microsoft.com/office/powerpoint/2010/main" val="364649325"/>
+      </p:ext>
+    </p:extLst>
+  </p:cSld>
+  <p:clrMapOvr>
+    <a:masterClrMapping/>
+  </p:clrMapOvr>
+  <p:timing>
+    <p:tnLst>
+      <p:par>
+        <p:cTn xmlns:p14="http://schemas.microsoft.com/office/powerpoint/2010/main" id="1" dur="indefinite" restart="never" nodeType="tmRoot"/>
+      </p:par>
+    </p:tnLst>
+  </p:timing>
+</p:sld>
+</file>
+
+<file path=ppt/slides/slide27.xml><?xml version="1.0" encoding="utf-8"?>
+<p:sld xmlns:a="http://schemas.openxmlformats.org/drawingml/2006/main" xmlns:r="http://schemas.openxmlformats.org/officeDocument/2006/relationships" xmlns:p="http://schemas.openxmlformats.org/presentationml/2006/main">
+  <p:cSld>
+    <p:spTree>
+      <p:nvGrpSpPr>
+        <p:cNvPr id="1" name=""/>
+        <p:cNvGrpSpPr/>
+        <p:nvPr/>
+      </p:nvGrpSpPr>
+      <p:grpSpPr>
+        <a:xfrm>
+          <a:off x="0" y="0"/>
+          <a:ext cx="0" cy="0"/>
+          <a:chOff x="0" y="0"/>
+          <a:chExt cx="0" cy="0"/>
+        </a:xfrm>
+      </p:grpSpPr>
+      <p:sp>
+        <p:nvSpPr>
+          <p:cNvPr id="2" name="Title 1"/>
+          <p:cNvSpPr>
+            <a:spLocks noGrp="1"/>
+          </p:cNvSpPr>
+          <p:nvPr>
+            <p:ph type="title"/>
+          </p:nvPr>
+        </p:nvSpPr>
+        <p:spPr/>
+        <p:txBody>
+          <a:bodyPr/>
+          <a:lstStyle/>
+          <a:p>
+            <a:r>
+              <a:rPr lang="en-US" dirty="0"/>
+              <a:t>TESTBED Evaluation </a:t>
+            </a:r>
+            <a:r>
+              <a:rPr lang="en-US" dirty="0" smtClean="0"/>
+              <a:t>(2/</a:t>
+            </a:r>
+            <a:r>
+              <a:rPr lang="en-US" dirty="0"/>
+              <a:t>2)</a:t>
+            </a:r>
+          </a:p>
+        </p:txBody>
+      </p:sp>
+      <p:pic>
+        <p:nvPicPr>
+          <p:cNvPr id="4" name="Picture 3" descr="dummynet-100ms-2.pdf"/>
+          <p:cNvPicPr>
+            <a:picLocks noChangeAspect="1"/>
+          </p:cNvPicPr>
+          <p:nvPr/>
+        </p:nvPicPr>
+        <p:blipFill>
+          <a:blip r:embed="rId2">
+            <a:extLst>
+              <a:ext uri="{28A0092B-C50C-407E-A947-70E740481C1C}">
+                <a14:useLocalDpi xmlns:a14="http://schemas.microsoft.com/office/drawing/2010/main" val="0"/>
+              </a:ext>
+            </a:extLst>
+          </a:blip>
+          <a:stretch>
+            <a:fillRect/>
+          </a:stretch>
+        </p:blipFill>
+        <p:spPr>
+          <a:xfrm>
+            <a:off x="0" y="1616921"/>
+            <a:ext cx="9144000" cy="4572000"/>
+          </a:xfrm>
+          <a:prstGeom prst="rect">
+            <a:avLst/>
+          </a:prstGeom>
+        </p:spPr>
+      </p:pic>
+      <p:sp>
+        <p:nvSpPr>
+          <p:cNvPr id="5" name="TextBox 4"/>
+          <p:cNvSpPr txBox="1"/>
+          <p:nvPr/>
+        </p:nvSpPr>
+        <p:spPr>
+          <a:xfrm>
+            <a:off x="284061" y="6387304"/>
+            <a:ext cx="6912337" cy="369332"/>
+          </a:xfrm>
+          <a:prstGeom prst="rect">
+            <a:avLst/>
+          </a:prstGeom>
+          <a:noFill/>
+        </p:spPr>
+        <p:txBody>
+          <a:bodyPr wrap="square" rtlCol="0">
+            <a:spAutoFit/>
+          </a:bodyPr>
+          <a:lstStyle/>
+          <a:p>
+            <a:pPr marL="285750" indent="-285750">
+              <a:buFont typeface="Arial"/>
+              <a:buChar char="•"/>
+            </a:pPr>
+            <a:r>
+              <a:rPr lang="en-US" dirty="0" smtClean="0"/>
+              <a:t>1Mbit/s link capacity, 100ms one-way-delay, </a:t>
+            </a:r>
+          </a:p>
+        </p:txBody>
+      </p:sp>
+    </p:spTree>
+    <p:extLst>
+      <p:ext uri="{BB962C8B-B14F-4D97-AF65-F5344CB8AC3E}">
+        <p14:creationId xmlns:p14="http://schemas.microsoft.com/office/powerpoint/2010/main" val="2761652557"/>
+      </p:ext>
+    </p:extLst>
+  </p:cSld>
+  <p:clrMapOvr>
+    <a:masterClrMapping/>
+  </p:clrMapOvr>
+</p:sld>
+</file>
+
+<file path=ppt/slides/slide28.xml><?xml version="1.0" encoding="utf-8"?>
+<p:sld xmlns:a="http://schemas.openxmlformats.org/drawingml/2006/main" xmlns:r="http://schemas.openxmlformats.org/officeDocument/2006/relationships" xmlns:p="http://schemas.openxmlformats.org/presentationml/2006/main">
+  <p:cSld>
+    <p:spTree>
+      <p:nvGrpSpPr>
+        <p:cNvPr id="1" name=""/>
+        <p:cNvGrpSpPr/>
+        <p:nvPr/>
+      </p:nvGrpSpPr>
+      <p:grpSpPr>
+        <a:xfrm>
+          <a:off x="0" y="0"/>
+          <a:ext cx="0" cy="0"/>
+          <a:chOff x="0" y="0"/>
+          <a:chExt cx="0" cy="0"/>
+        </a:xfrm>
+      </p:grpSpPr>
+      <p:sp>
+        <p:nvSpPr>
+          <p:cNvPr id="2" name="Title 1"/>
+          <p:cNvSpPr>
+            <a:spLocks noGrp="1"/>
+          </p:cNvSpPr>
+          <p:nvPr>
+            <p:ph type="title"/>
+          </p:nvPr>
+        </p:nvSpPr>
+        <p:spPr/>
+        <p:txBody>
+          <a:bodyPr/>
+          <a:lstStyle/>
+          <a:p>
+            <a:r>
+              <a:rPr lang="en-US" dirty="0" smtClean="0"/>
+              <a:t>Next steps</a:t>
+            </a:r>
+            <a:endParaRPr lang="en-US" dirty="0"/>
+          </a:p>
+        </p:txBody>
+      </p:sp>
+      <p:sp>
+        <p:nvSpPr>
+          <p:cNvPr id="3" name="Content Placeholder 2"/>
+          <p:cNvSpPr>
+            <a:spLocks noGrp="1"/>
+          </p:cNvSpPr>
+          <p:nvPr>
+            <p:ph idx="1"/>
+          </p:nvPr>
+        </p:nvSpPr>
+        <p:spPr/>
+        <p:txBody>
+          <a:bodyPr>
+            <a:normAutofit/>
+          </a:bodyPr>
+          <a:lstStyle/>
+          <a:p>
+            <a:r>
+              <a:rPr lang="en-US" dirty="0" smtClean="0"/>
+              <a:t>Code: (coming soon)</a:t>
+            </a:r>
+          </a:p>
+          <a:p>
+            <a:pPr lvl="1"/>
+            <a:r>
+              <a:rPr lang="sv-SE" sz="1800" dirty="0" smtClean="0">
+                <a:hlinkClick r:id="rId2"/>
+              </a:rPr>
+              <a:t>https://github.com/protocols-comnet/rmcat-adaptive-fec-code</a:t>
+            </a:r>
+            <a:r>
+              <a:rPr lang="sv-SE" dirty="0" smtClean="0"/>
+              <a:t> </a:t>
+            </a:r>
+          </a:p>
+          <a:p>
+            <a:endParaRPr lang="en-US" dirty="0" smtClean="0"/>
+          </a:p>
+          <a:p>
+            <a:r>
+              <a:rPr lang="en-US" dirty="0" smtClean="0"/>
+              <a:t>Evaluation Paper:</a:t>
+            </a:r>
+          </a:p>
+          <a:p>
+            <a:pPr lvl="1"/>
+            <a:r>
+              <a:rPr lang="en-US" sz="1600" dirty="0" smtClean="0"/>
+              <a:t>Nagy M., Singh V., </a:t>
+            </a:r>
+            <a:r>
+              <a:rPr lang="en-US" sz="1600" dirty="0" err="1" smtClean="0"/>
+              <a:t>Ott</a:t>
+            </a:r>
+            <a:r>
+              <a:rPr lang="en-US" sz="1600" dirty="0" smtClean="0"/>
+              <a:t> J., </a:t>
+            </a:r>
+            <a:r>
+              <a:rPr lang="en-US" sz="1600" dirty="0" err="1" smtClean="0"/>
+              <a:t>Eggert</a:t>
+            </a:r>
+            <a:r>
+              <a:rPr lang="en-US" sz="1600" dirty="0" smtClean="0"/>
+              <a:t> L., Congestion Control using FEC for Conversational Multimedia Communication, Proc. of ACM Multimedia Systems, Singapore, SG, Mar, 2014,</a:t>
+            </a:r>
+            <a:endParaRPr lang="en-US" dirty="0" smtClean="0"/>
+          </a:p>
+          <a:p>
+            <a:pPr lvl="8"/>
+            <a:endParaRPr lang="en-US" dirty="0" smtClean="0"/>
+          </a:p>
+          <a:p>
+            <a:r>
+              <a:rPr lang="en-US" dirty="0" smtClean="0"/>
+              <a:t>More </a:t>
+            </a:r>
+            <a:r>
+              <a:rPr lang="en-US" dirty="0" smtClean="0"/>
+              <a:t>feedback is appreciated </a:t>
+            </a:r>
+            <a:r>
+              <a:rPr lang="en-US" dirty="0" smtClean="0">
+                <a:sym typeface="Wingdings"/>
+              </a:rPr>
+              <a:t></a:t>
+            </a:r>
+            <a:endParaRPr lang="en-US" dirty="0" smtClean="0"/>
+          </a:p>
+          <a:p>
+            <a:pPr lvl="1"/>
+            <a:endParaRPr lang="en-US" dirty="0"/>
+          </a:p>
+        </p:txBody>
+      </p:sp>
+    </p:spTree>
+    <p:extLst>
+      <p:ext uri="{BB962C8B-B14F-4D97-AF65-F5344CB8AC3E}">
+        <p14:creationId xmlns:p14="http://schemas.microsoft.com/office/powerpoint/2010/main" val="2040030496"/>
       </p:ext>
     </p:extLst>
   </p:cSld>
@@ -5155,6 +6347,77 @@
           </a:xfrm>
         </p:spPr>
       </p:pic>
+      <p:sp>
+        <p:nvSpPr>
+          <p:cNvPr id="3" name="TextBox 2"/>
+          <p:cNvSpPr txBox="1"/>
+          <p:nvPr/>
+        </p:nvSpPr>
+        <p:spPr>
+          <a:xfrm>
+            <a:off x="4343590" y="2554694"/>
+            <a:ext cx="762362" cy="461665"/>
+          </a:xfrm>
+          <a:prstGeom prst="rect">
+            <a:avLst/>
+          </a:prstGeom>
+          <a:solidFill>
+            <a:schemeClr val="tx2">
+              <a:lumMod val="20000"/>
+              <a:lumOff val="80000"/>
+            </a:schemeClr>
+          </a:solidFill>
+        </p:spPr>
+        <p:txBody>
+          <a:bodyPr wrap="none" rtlCol="0">
+            <a:spAutoFit/>
+          </a:bodyPr>
+          <a:lstStyle/>
+          <a:p>
+            <a:r>
+              <a:rPr lang="en-US" sz="2400" dirty="0" smtClean="0"/>
+              <a:t>FEC</a:t>
+            </a:r>
+            <a:endParaRPr lang="en-US" sz="2400" dirty="0"/>
+          </a:p>
+        </p:txBody>
+      </p:sp>
+      <p:sp>
+        <p:nvSpPr>
+          <p:cNvPr id="5" name="TextBox 4"/>
+          <p:cNvSpPr txBox="1"/>
+          <p:nvPr/>
+        </p:nvSpPr>
+        <p:spPr>
+          <a:xfrm>
+            <a:off x="6038912" y="6334780"/>
+            <a:ext cx="2880939" cy="523220"/>
+          </a:xfrm>
+          <a:prstGeom prst="rect">
+            <a:avLst/>
+          </a:prstGeom>
+          <a:noFill/>
+        </p:spPr>
+        <p:txBody>
+          <a:bodyPr wrap="none" rtlCol="0">
+            <a:spAutoFit/>
+          </a:bodyPr>
+          <a:lstStyle/>
+          <a:p>
+            <a:r>
+              <a:rPr lang="en-US" sz="1400" dirty="0" smtClean="0"/>
+              <a:t>SSA: Adaptive packet sizes</a:t>
+            </a:r>
+          </a:p>
+          <a:p>
+            <a:r>
+              <a:rPr lang="en-US" sz="1400" dirty="0" smtClean="0"/>
+              <a:t>RPS: reference picture selection</a:t>
+            </a:r>
+            <a:endParaRPr lang="en-US" sz="1400" dirty="0"/>
+          </a:p>
+        </p:txBody>
+      </p:sp>
     </p:spTree>
     <p:extLst>
       <p:ext uri="{BB962C8B-B14F-4D97-AF65-F5344CB8AC3E}">
@@ -9716,68 +10979,77 @@
         </p:nvSpPr>
         <p:spPr/>
         <p:txBody>
-          <a:bodyPr/>
-          <a:lstStyle/>
-          <a:p>
+          <a:bodyPr>
+            <a:normAutofit/>
+          </a:bodyPr>
+          <a:lstStyle/>
+          <a:p>
+            <a:r>
+              <a:rPr lang="en-US" dirty="0" smtClean="0"/>
+              <a:t>Currently, using </a:t>
+            </a:r>
+            <a:endParaRPr lang="en-US" dirty="0" smtClean="0"/>
+          </a:p>
+          <a:p>
+            <a:pPr lvl="1"/>
+            <a:r>
+              <a:rPr lang="en-US" dirty="0" smtClean="0"/>
+              <a:t>parity</a:t>
+            </a:r>
+            <a:r>
+              <a:rPr lang="en-US" dirty="0" smtClean="0"/>
+              <a:t>, 1- or 2-d interleaved </a:t>
+            </a:r>
+            <a:r>
+              <a:rPr lang="en-US" dirty="0" smtClean="0"/>
+              <a:t>XOR (</a:t>
+            </a:r>
+            <a:r>
+              <a:rPr lang="en-US" dirty="0" smtClean="0"/>
+              <a:t>for b</a:t>
+            </a:r>
+            <a:r>
+              <a:rPr lang="en-US" dirty="0" smtClean="0"/>
+              <a:t>urst loss)</a:t>
+            </a:r>
+          </a:p>
+          <a:p>
+            <a:pPr lvl="1"/>
             <a:r>
               <a:rPr lang="en-US" dirty="0"/>
-              <a:t>Open </a:t>
+              <a:t>There </a:t>
             </a:r>
             <a:r>
               <a:rPr lang="en-US" dirty="0" smtClean="0"/>
-              <a:t>Issue</a:t>
-            </a:r>
-          </a:p>
-          <a:p>
-            <a:pPr lvl="1"/>
+              <a:t>is </a:t>
+            </a:r>
+            <a:r>
+              <a:rPr lang="en-US" dirty="0"/>
+              <a:t>discussion in RTCWEB on FEC </a:t>
+            </a:r>
             <a:r>
               <a:rPr lang="en-US" dirty="0" smtClean="0"/>
-              <a:t>Leave it open</a:t>
-            </a:r>
-            <a:r>
-              <a:rPr lang="en-US" dirty="0"/>
-              <a:t> </a:t>
-            </a:r>
-            <a:r>
-              <a:rPr lang="en-US" dirty="0" smtClean="0"/>
-              <a:t>i.e</a:t>
-            </a:r>
-            <a:r>
-              <a:rPr lang="en-US" dirty="0"/>
-              <a:t>.</a:t>
-            </a:r>
-            <a:r>
-              <a:rPr lang="en-US" dirty="0" smtClean="0"/>
-              <a:t>, generic</a:t>
-            </a:r>
+              <a:t>schemes.</a:t>
+            </a:r>
+            <a:endParaRPr lang="en-US" dirty="0" smtClean="0"/>
           </a:p>
           <a:p>
             <a:pPr lvl="1"/>
             <a:endParaRPr lang="en-US" dirty="0" smtClean="0"/>
           </a:p>
           <a:p>
+            <a:r>
+              <a:rPr lang="en-US" dirty="0" smtClean="0"/>
+              <a:t>But,</a:t>
+            </a:r>
+            <a:endParaRPr lang="en-US" dirty="0"/>
+          </a:p>
+          <a:p>
             <a:pPr lvl="1"/>
             <a:r>
               <a:rPr lang="en-US" dirty="0" smtClean="0"/>
-              <a:t>Or, RF5109 (ULP), RFC6015 (1-d interleaved), parity, 1- or 2-d interleaved XOR, Reed-Solomon, …</a:t>
-            </a:r>
-          </a:p>
-          <a:p>
-            <a:pPr lvl="1"/>
-            <a:endParaRPr lang="en-US" dirty="0"/>
-          </a:p>
-          <a:p>
-            <a:pPr lvl="1"/>
-            <a:r>
-              <a:rPr lang="en-US" dirty="0" smtClean="0"/>
-              <a:t>There was discussion in RTCWEB on FEC Schemes.</a:t>
-            </a:r>
-          </a:p>
-          <a:p>
-            <a:pPr lvl="1"/>
-            <a:endParaRPr lang="en-US" dirty="0" smtClean="0"/>
-          </a:p>
-          <a:p>
+              <a:t>It could be applied to other schemes</a:t>
+            </a:r>
             <a:endParaRPr lang="en-US" dirty="0" smtClean="0"/>
           </a:p>
           <a:p>

</xml_diff>